<commit_message>
male prepravke na posteru
</commit_message>
<xml_diff>
--- a/poster Solun maj 2024/Solun poster 001.pptx
+++ b/poster Solun maj 2024/Solun poster 001.pptx
@@ -1943,21 +1943,21 @@
     </dgm:pt>
   </dgm:ptLst>
   <dgm:cxnLst>
+    <dgm:cxn modelId="{77B19E57-37CF-4D7F-8567-1CB6667515CB}" type="presOf" srcId="{A491963B-FA65-4F9A-A948-8D6552EF7FBD}" destId="{8F882EF6-49EC-4B53-B100-EAD4E720298A}" srcOrd="1" destOrd="0" presId="urn:microsoft.com/office/officeart/2005/8/layout/process1"/>
     <dgm:cxn modelId="{039EE9CB-942E-4BB3-B9DC-936A8F50F939}" srcId="{084DAEBC-087F-4D15-B752-4785C0673660}" destId="{F6006F7E-AC86-45B0-8635-2B1FB4B48637}" srcOrd="3" destOrd="0" parTransId="{9BB6F8E7-7675-44CB-9DA3-545DA6F36E9D}" sibTransId="{DE65469D-6D73-4E22-BA1D-C8408998D1F0}"/>
-    <dgm:cxn modelId="{8F79D79C-09D6-487D-8FD1-87A5FD0DF99A}" type="presOf" srcId="{084DAEBC-087F-4D15-B752-4785C0673660}" destId="{4DF115B0-D97C-4D45-995F-751D171483ED}" srcOrd="0" destOrd="0" presId="urn:microsoft.com/office/officeart/2005/8/layout/process1"/>
+    <dgm:cxn modelId="{F0E2C854-E738-4B9A-99E1-2771B60C9447}" srcId="{084DAEBC-087F-4D15-B752-4785C0673660}" destId="{FFE45BF6-B8B7-4DF6-B255-42C35051D756}" srcOrd="2" destOrd="0" parTransId="{550CEC22-6DA6-4C97-9825-0EA4212E08F2}" sibTransId="{A491963B-FA65-4F9A-A948-8D6552EF7FBD}"/>
     <dgm:cxn modelId="{BB129FEE-B7DF-409C-94FD-C3180D7E6BCB}" type="presOf" srcId="{FFE45BF6-B8B7-4DF6-B255-42C35051D756}" destId="{0B7A5903-CDD3-4CC0-94BF-E92BA3DA96DD}" srcOrd="0" destOrd="0" presId="urn:microsoft.com/office/officeart/2005/8/layout/process1"/>
-    <dgm:cxn modelId="{467FE643-5A2A-4725-9326-4A4BE2A4EDD6}" type="presOf" srcId="{F6006F7E-AC86-45B0-8635-2B1FB4B48637}" destId="{2DFA93C7-BE63-4691-A297-B8C9BB46D38B}" srcOrd="0" destOrd="0" presId="urn:microsoft.com/office/officeart/2005/8/layout/process1"/>
-    <dgm:cxn modelId="{77B19E57-37CF-4D7F-8567-1CB6667515CB}" type="presOf" srcId="{A491963B-FA65-4F9A-A948-8D6552EF7FBD}" destId="{8F882EF6-49EC-4B53-B100-EAD4E720298A}" srcOrd="1" destOrd="0" presId="urn:microsoft.com/office/officeart/2005/8/layout/process1"/>
-    <dgm:cxn modelId="{CF05EDF1-8EB6-4600-B8CE-CA21F2358774}" type="presOf" srcId="{A491963B-FA65-4F9A-A948-8D6552EF7FBD}" destId="{9132B67F-A38C-4915-8317-7B8D2EEE0C67}" srcOrd="0" destOrd="0" presId="urn:microsoft.com/office/officeart/2005/8/layout/process1"/>
-    <dgm:cxn modelId="{8A0A7A8C-9957-45EB-A42F-57DBD8274257}" srcId="{084DAEBC-087F-4D15-B752-4785C0673660}" destId="{8D948468-426C-430E-8463-EA0A9047AA97}" srcOrd="0" destOrd="0" parTransId="{089F8F6F-ED72-497F-B944-BDE96C4547C5}" sibTransId="{55FCA17C-1EF6-4064-B59A-DED79FC40987}"/>
     <dgm:cxn modelId="{1F63834A-14E8-4045-ADBC-17DC5CB5F954}" type="presOf" srcId="{55FCA17C-1EF6-4064-B59A-DED79FC40987}" destId="{49AB3AA5-5C37-401B-BD24-8CDBE6CDE631}" srcOrd="0" destOrd="0" presId="urn:microsoft.com/office/officeart/2005/8/layout/process1"/>
     <dgm:cxn modelId="{BEBA565C-4BB6-4FAC-8220-2037A2C4BB59}" type="presOf" srcId="{AAF2528D-193F-4D93-A91F-6874F8247A7E}" destId="{9D036536-CA58-460B-9592-E804F4957C65}" srcOrd="0" destOrd="0" presId="urn:microsoft.com/office/officeart/2005/8/layout/process1"/>
+    <dgm:cxn modelId="{8F79D79C-09D6-487D-8FD1-87A5FD0DF99A}" type="presOf" srcId="{084DAEBC-087F-4D15-B752-4785C0673660}" destId="{4DF115B0-D97C-4D45-995F-751D171483ED}" srcOrd="0" destOrd="0" presId="urn:microsoft.com/office/officeart/2005/8/layout/process1"/>
+    <dgm:cxn modelId="{C3E2F7B3-4158-494E-83A1-75C1933FC0BF}" type="presOf" srcId="{AAF2528D-193F-4D93-A91F-6874F8247A7E}" destId="{5484F5B9-AF2E-4D41-B34C-14F23DAB6613}" srcOrd="1" destOrd="0" presId="urn:microsoft.com/office/officeart/2005/8/layout/process1"/>
     <dgm:cxn modelId="{29E6CB5C-90D4-4537-A08F-602AB69E1185}" type="presOf" srcId="{8D948468-426C-430E-8463-EA0A9047AA97}" destId="{9039D0E1-9BDE-4D45-A61C-BA5F9D629281}" srcOrd="0" destOrd="0" presId="urn:microsoft.com/office/officeart/2005/8/layout/process1"/>
-    <dgm:cxn modelId="{F0E2C854-E738-4B9A-99E1-2771B60C9447}" srcId="{084DAEBC-087F-4D15-B752-4785C0673660}" destId="{FFE45BF6-B8B7-4DF6-B255-42C35051D756}" srcOrd="2" destOrd="0" parTransId="{550CEC22-6DA6-4C97-9825-0EA4212E08F2}" sibTransId="{A491963B-FA65-4F9A-A948-8D6552EF7FBD}"/>
-    <dgm:cxn modelId="{D87ED65A-1EE6-4167-9E92-EF0162A41ED0}" type="presOf" srcId="{55FCA17C-1EF6-4064-B59A-DED79FC40987}" destId="{B24ED164-7D46-4FE6-99D4-115D05EB5090}" srcOrd="1" destOrd="0" presId="urn:microsoft.com/office/officeart/2005/8/layout/process1"/>
     <dgm:cxn modelId="{CE4C3E71-01BF-48FF-8849-74C1F916C255}" type="presOf" srcId="{4DBB097A-AAC8-4558-83CD-5D293BA0E73F}" destId="{266EB45E-0BF0-4F15-90A8-48CDB3BB1843}" srcOrd="0" destOrd="0" presId="urn:microsoft.com/office/officeart/2005/8/layout/process1"/>
     <dgm:cxn modelId="{2D6E6A99-0884-421B-9583-F66FB72B4CE8}" srcId="{084DAEBC-087F-4D15-B752-4785C0673660}" destId="{4DBB097A-AAC8-4558-83CD-5D293BA0E73F}" srcOrd="1" destOrd="0" parTransId="{F66D8E7D-91C7-486F-96A1-E8901AD94FBA}" sibTransId="{AAF2528D-193F-4D93-A91F-6874F8247A7E}"/>
-    <dgm:cxn modelId="{C3E2F7B3-4158-494E-83A1-75C1933FC0BF}" type="presOf" srcId="{AAF2528D-193F-4D93-A91F-6874F8247A7E}" destId="{5484F5B9-AF2E-4D41-B34C-14F23DAB6613}" srcOrd="1" destOrd="0" presId="urn:microsoft.com/office/officeart/2005/8/layout/process1"/>
+    <dgm:cxn modelId="{CF05EDF1-8EB6-4600-B8CE-CA21F2358774}" type="presOf" srcId="{A491963B-FA65-4F9A-A948-8D6552EF7FBD}" destId="{9132B67F-A38C-4915-8317-7B8D2EEE0C67}" srcOrd="0" destOrd="0" presId="urn:microsoft.com/office/officeart/2005/8/layout/process1"/>
+    <dgm:cxn modelId="{467FE643-5A2A-4725-9326-4A4BE2A4EDD6}" type="presOf" srcId="{F6006F7E-AC86-45B0-8635-2B1FB4B48637}" destId="{2DFA93C7-BE63-4691-A297-B8C9BB46D38B}" srcOrd="0" destOrd="0" presId="urn:microsoft.com/office/officeart/2005/8/layout/process1"/>
+    <dgm:cxn modelId="{D87ED65A-1EE6-4167-9E92-EF0162A41ED0}" type="presOf" srcId="{55FCA17C-1EF6-4064-B59A-DED79FC40987}" destId="{B24ED164-7D46-4FE6-99D4-115D05EB5090}" srcOrd="1" destOrd="0" presId="urn:microsoft.com/office/officeart/2005/8/layout/process1"/>
+    <dgm:cxn modelId="{8A0A7A8C-9957-45EB-A42F-57DBD8274257}" srcId="{084DAEBC-087F-4D15-B752-4785C0673660}" destId="{8D948468-426C-430E-8463-EA0A9047AA97}" srcOrd="0" destOrd="0" parTransId="{089F8F6F-ED72-497F-B944-BDE96C4547C5}" sibTransId="{55FCA17C-1EF6-4064-B59A-DED79FC40987}"/>
     <dgm:cxn modelId="{2EE71F70-44B8-4167-AE8E-D808B4B8507E}" type="presParOf" srcId="{4DF115B0-D97C-4D45-995F-751D171483ED}" destId="{9039D0E1-9BDE-4D45-A61C-BA5F9D629281}" srcOrd="0" destOrd="0" presId="urn:microsoft.com/office/officeart/2005/8/layout/process1"/>
     <dgm:cxn modelId="{C6CBE64A-4FE6-4DA8-BB33-48D1672F1161}" type="presParOf" srcId="{4DF115B0-D97C-4D45-995F-751D171483ED}" destId="{49AB3AA5-5C37-401B-BD24-8CDBE6CDE631}" srcOrd="1" destOrd="0" presId="urn:microsoft.com/office/officeart/2005/8/layout/process1"/>
     <dgm:cxn modelId="{5B0FFD9C-195F-45EB-BCE5-2493D4E9AA6C}" type="presParOf" srcId="{49AB3AA5-5C37-401B-BD24-8CDBE6CDE631}" destId="{B24ED164-7D46-4FE6-99D4-115D05EB5090}" srcOrd="0" destOrd="0" presId="urn:microsoft.com/office/officeart/2005/8/layout/process1"/>
@@ -8681,7 +8681,7 @@
           <p:cNvPr id="28" name="Rounded Rectangle 3">
             <a:extLst>
               <a:ext uri="{FF2B5EF4-FFF2-40B4-BE49-F238E27FC236}">
-                <a16:creationId xmlns:a16="http://schemas.microsoft.com/office/drawing/2014/main" xmlns="" id="{E42E21C6-7A64-4E84-A503-EF9679DF851D}"/>
+                <a16:creationId xmlns="" xmlns:a16="http://schemas.microsoft.com/office/drawing/2014/main" id="{E42E21C6-7A64-4E84-A503-EF9679DF851D}"/>
               </a:ext>
             </a:extLst>
           </p:cNvPr>
@@ -8754,7 +8754,7 @@
           <p:cNvPr id="27" name="Rounded Rectangle 3">
             <a:extLst>
               <a:ext uri="{FF2B5EF4-FFF2-40B4-BE49-F238E27FC236}">
-                <a16:creationId xmlns:a16="http://schemas.microsoft.com/office/drawing/2014/main" xmlns="" id="{1C16C5A3-8C37-4B07-AA5E-BABF5084826F}"/>
+                <a16:creationId xmlns="" xmlns:a16="http://schemas.microsoft.com/office/drawing/2014/main" id="{1C16C5A3-8C37-4B07-AA5E-BABF5084826F}"/>
               </a:ext>
             </a:extLst>
           </p:cNvPr>
@@ -8832,7 +8832,7 @@
         </p:nvSpPr>
         <p:spPr>
           <a:xfrm>
-            <a:off x="28909" y="1761953"/>
+            <a:off x="0" y="1329905"/>
             <a:ext cx="30600650" cy="3899567"/>
           </a:xfrm>
           <a:prstGeom prst="rect">
@@ -9978,7 +9978,7 @@
         </p:nvSpPr>
         <p:spPr>
           <a:xfrm>
-            <a:off x="1402781" y="6154441"/>
+            <a:off x="1402781" y="5506369"/>
             <a:ext cx="12745416" cy="7998722"/>
           </a:xfrm>
           <a:prstGeom prst="roundRect">
@@ -10045,7 +10045,7 @@
         </p:nvSpPr>
         <p:spPr>
           <a:xfrm>
-            <a:off x="4067077" y="6514481"/>
+            <a:off x="4067077" y="5866409"/>
             <a:ext cx="7344816" cy="1224136"/>
           </a:xfrm>
           <a:prstGeom prst="roundRect">
@@ -10219,7 +10219,7 @@
         </p:nvSpPr>
         <p:spPr>
           <a:xfrm>
-            <a:off x="1114749" y="30997201"/>
+            <a:off x="970733" y="31717281"/>
             <a:ext cx="13465496" cy="7920880"/>
           </a:xfrm>
           <a:prstGeom prst="roundRect">
@@ -10270,7 +10270,7 @@
         </p:nvSpPr>
         <p:spPr>
           <a:xfrm>
-            <a:off x="2194869" y="31645273"/>
+            <a:off x="2122861" y="32077321"/>
             <a:ext cx="11089232" cy="1080120"/>
           </a:xfrm>
           <a:prstGeom prst="roundRect">
@@ -10321,7 +10321,7 @@
         </p:nvSpPr>
         <p:spPr>
           <a:xfrm>
-            <a:off x="11771933" y="14297075"/>
+            <a:off x="11627917" y="13931305"/>
             <a:ext cx="7344816" cy="1224136"/>
           </a:xfrm>
           <a:prstGeom prst="roundRect">
@@ -10372,7 +10372,7 @@
         </p:nvSpPr>
         <p:spPr>
           <a:xfrm>
-            <a:off x="1978845" y="7954641"/>
+            <a:off x="1906837" y="7378577"/>
             <a:ext cx="11665296" cy="6001643"/>
           </a:xfrm>
           <a:prstGeom prst="rect">
@@ -10460,7 +10460,7 @@
         </p:nvSpPr>
         <p:spPr>
           <a:xfrm>
-            <a:off x="15372333" y="6226449"/>
+            <a:off x="15084301" y="5578377"/>
             <a:ext cx="12745416" cy="7926714"/>
           </a:xfrm>
           <a:prstGeom prst="roundRect">
@@ -10527,7 +10527,7 @@
         </p:nvSpPr>
         <p:spPr>
           <a:xfrm>
-            <a:off x="16956509" y="6298457"/>
+            <a:off x="16740485" y="5722393"/>
             <a:ext cx="9937104" cy="1224136"/>
           </a:xfrm>
           <a:prstGeom prst="roundRect">
@@ -10590,7 +10590,7 @@
         </p:nvSpPr>
         <p:spPr>
           <a:xfrm>
-            <a:off x="15948397" y="7522593"/>
+            <a:off x="15876389" y="7018537"/>
             <a:ext cx="11377264" cy="6494085"/>
           </a:xfrm>
           <a:prstGeom prst="rect">
@@ -10906,7 +10906,7 @@
           <p:cNvPr id="30" name="Rounded Rectangle 47">
             <a:extLst>
               <a:ext uri="{FF2B5EF4-FFF2-40B4-BE49-F238E27FC236}">
-                <a16:creationId xmlns:a16="http://schemas.microsoft.com/office/drawing/2014/main" xmlns="" id="{33946411-5D0B-4586-92C0-9422A01632C7}"/>
+                <a16:creationId xmlns="" xmlns:a16="http://schemas.microsoft.com/office/drawing/2014/main" id="{33946411-5D0B-4586-92C0-9422A01632C7}"/>
               </a:ext>
             </a:extLst>
           </p:cNvPr>
@@ -10915,7 +10915,7 @@
         </p:nvSpPr>
         <p:spPr>
           <a:xfrm>
-            <a:off x="3219036" y="15443473"/>
+            <a:off x="3274989" y="15443473"/>
             <a:ext cx="7616793" cy="748945"/>
           </a:xfrm>
           <a:prstGeom prst="roundRect">
@@ -10963,7 +10963,7 @@
           <p:cNvPr id="31" name="Rounded Rectangle 47">
             <a:extLst>
               <a:ext uri="{FF2B5EF4-FFF2-40B4-BE49-F238E27FC236}">
-                <a16:creationId xmlns:a16="http://schemas.microsoft.com/office/drawing/2014/main" xmlns="" id="{5FB06176-787A-4601-99AD-07335A70D009}"/>
+                <a16:creationId xmlns="" xmlns:a16="http://schemas.microsoft.com/office/drawing/2014/main" id="{5FB06176-787A-4601-99AD-07335A70D009}"/>
               </a:ext>
             </a:extLst>
           </p:cNvPr>
@@ -11020,7 +11020,7 @@
           <p:cNvPr id="14" name="Diagram 13">
             <a:extLst>
               <a:ext uri="{FF2B5EF4-FFF2-40B4-BE49-F238E27FC236}">
-                <a16:creationId xmlns:a16="http://schemas.microsoft.com/office/drawing/2014/main" xmlns="" id="{AA320E81-5855-4B1B-A249-74E4C7FE7477}"/>
+                <a16:creationId xmlns="" xmlns:a16="http://schemas.microsoft.com/office/drawing/2014/main" id="{AA320E81-5855-4B1B-A249-74E4C7FE7477}"/>
               </a:ext>
             </a:extLst>
           </p:cNvPr>
@@ -11048,7 +11048,7 @@
           <p:cNvPr id="1026" name="Picture 2" descr="https://assets-global.website-files.com/621e95f9ac30687a56e4297e/64a8d750505cf8e707066669_V2_1676215759712_7b2330a6-df89-49b4-be67-3b44bfb50040.png">
             <a:extLst>
               <a:ext uri="{FF2B5EF4-FFF2-40B4-BE49-F238E27FC236}">
-                <a16:creationId xmlns:a16="http://schemas.microsoft.com/office/drawing/2014/main" xmlns="" id="{EBEBC945-E341-4136-8DC8-448F42B87F70}"/>
+                <a16:creationId xmlns="" xmlns:a16="http://schemas.microsoft.com/office/drawing/2014/main" id="{EBEBC945-E341-4136-8DC8-448F42B87F70}"/>
               </a:ext>
             </a:extLst>
           </p:cNvPr>
@@ -11093,7 +11093,7 @@
           <p:cNvPr id="44" name="Picture 2" descr="https://assets-global.website-files.com/621e95f9ac30687a56e4297e/64a8d750505cf8e707066669_V2_1676215759712_7b2330a6-df89-49b4-be67-3b44bfb50040.png">
             <a:extLst>
               <a:ext uri="{FF2B5EF4-FFF2-40B4-BE49-F238E27FC236}">
-                <a16:creationId xmlns:a16="http://schemas.microsoft.com/office/drawing/2014/main" xmlns="" id="{34F3213A-A300-4253-B3DE-16FD671B4B9E}"/>
+                <a16:creationId xmlns="" xmlns:a16="http://schemas.microsoft.com/office/drawing/2014/main" id="{34F3213A-A300-4253-B3DE-16FD671B4B9E}"/>
               </a:ext>
             </a:extLst>
           </p:cNvPr>
@@ -11138,7 +11138,7 @@
           <p:cNvPr id="18" name="Rectangle 17">
             <a:extLst>
               <a:ext uri="{FF2B5EF4-FFF2-40B4-BE49-F238E27FC236}">
-                <a16:creationId xmlns:a16="http://schemas.microsoft.com/office/drawing/2014/main" xmlns="" id="{15C5418E-2EC7-4CDD-A50D-4A1976FD60F2}"/>
+                <a16:creationId xmlns="" xmlns:a16="http://schemas.microsoft.com/office/drawing/2014/main" id="{15C5418E-2EC7-4CDD-A50D-4A1976FD60F2}"/>
               </a:ext>
             </a:extLst>
           </p:cNvPr>
@@ -11267,16 +11267,7 @@
                 </a:solidFill>
                 <a:latin typeface="Calibri" panose="020F0502020204030204" pitchFamily="34" charset="0"/>
               </a:rPr>
-              <a:t>Q by using the </a:t>
-            </a:r>
-            <a:r>
-              <a:rPr lang="en-US" sz="1600" dirty="0">
-                <a:solidFill>
-                  <a:srgbClr val="000000"/>
-                </a:solidFill>
-                <a:latin typeface="Calibri" panose="020F0502020204030204" pitchFamily="34" charset="0"/>
-              </a:rPr>
-              <a:t>SPELL engine [6</a:t>
+              <a:t>Q by using the SPELL engine [6</a:t>
             </a:r>
             <a:r>
               <a:rPr lang="en-US" sz="1600" dirty="0" smtClean="0">
@@ -11305,7 +11296,7 @@
           <p:cNvPr id="49" name="Rectangle 48">
             <a:extLst>
               <a:ext uri="{FF2B5EF4-FFF2-40B4-BE49-F238E27FC236}">
-                <a16:creationId xmlns:a16="http://schemas.microsoft.com/office/drawing/2014/main" xmlns="" id="{7FA12D37-8BE6-48FA-A3E0-7F6D80828A2A}"/>
+                <a16:creationId xmlns="" xmlns:a16="http://schemas.microsoft.com/office/drawing/2014/main" id="{7FA12D37-8BE6-48FA-A3E0-7F6D80828A2A}"/>
               </a:ext>
             </a:extLst>
           </p:cNvPr>
@@ -11691,7 +11682,7 @@
           <p:cNvPr id="50" name="Rectangle 49">
             <a:extLst>
               <a:ext uri="{FF2B5EF4-FFF2-40B4-BE49-F238E27FC236}">
-                <a16:creationId xmlns:a16="http://schemas.microsoft.com/office/drawing/2014/main" xmlns="" id="{8E1A2B0C-839C-4318-ACA5-56B88B30D089}"/>
+                <a16:creationId xmlns="" xmlns:a16="http://schemas.microsoft.com/office/drawing/2014/main" id="{8E1A2B0C-839C-4318-ACA5-56B88B30D089}"/>
               </a:ext>
             </a:extLst>
           </p:cNvPr>
@@ -11866,7 +11857,7 @@
           <p:cNvPr id="52" name="Rounded Rectangle 47">
             <a:extLst>
               <a:ext uri="{FF2B5EF4-FFF2-40B4-BE49-F238E27FC236}">
-                <a16:creationId xmlns:a16="http://schemas.microsoft.com/office/drawing/2014/main" xmlns="" id="{82BE85DE-FD18-4E3E-BE20-52E122985005}"/>
+                <a16:creationId xmlns="" xmlns:a16="http://schemas.microsoft.com/office/drawing/2014/main" id="{82BE85DE-FD18-4E3E-BE20-52E122985005}"/>
               </a:ext>
             </a:extLst>
           </p:cNvPr>
@@ -11923,7 +11914,7 @@
           <p:cNvPr id="20" name="Arrow: Right 19">
             <a:extLst>
               <a:ext uri="{FF2B5EF4-FFF2-40B4-BE49-F238E27FC236}">
-                <a16:creationId xmlns:a16="http://schemas.microsoft.com/office/drawing/2014/main" xmlns="" id="{F75BF84B-2C0D-4C09-BA31-AFAAC77EAF11}"/>
+                <a16:creationId xmlns="" xmlns:a16="http://schemas.microsoft.com/office/drawing/2014/main" id="{F75BF84B-2C0D-4C09-BA31-AFAAC77EAF11}"/>
               </a:ext>
             </a:extLst>
           </p:cNvPr>
@@ -11969,7 +11960,7 @@
           <p:cNvPr id="55" name="Arrow: Right 54">
             <a:extLst>
               <a:ext uri="{FF2B5EF4-FFF2-40B4-BE49-F238E27FC236}">
-                <a16:creationId xmlns:a16="http://schemas.microsoft.com/office/drawing/2014/main" xmlns="" id="{9FFA1951-3CD1-43F1-812E-2361512B994A}"/>
+                <a16:creationId xmlns="" xmlns:a16="http://schemas.microsoft.com/office/drawing/2014/main" id="{9FFA1951-3CD1-43F1-812E-2361512B994A}"/>
               </a:ext>
             </a:extLst>
           </p:cNvPr>
@@ -12015,7 +12006,7 @@
           <p:cNvPr id="56" name="Rectangle 55">
             <a:extLst>
               <a:ext uri="{FF2B5EF4-FFF2-40B4-BE49-F238E27FC236}">
-                <a16:creationId xmlns:a16="http://schemas.microsoft.com/office/drawing/2014/main" xmlns="" id="{54B82BF6-7CC1-4CC0-A076-02DDFFB69BDA}"/>
+                <a16:creationId xmlns="" xmlns:a16="http://schemas.microsoft.com/office/drawing/2014/main" id="{54B82BF6-7CC1-4CC0-A076-02DDFFB69BDA}"/>
               </a:ext>
             </a:extLst>
           </p:cNvPr>
@@ -12376,7 +12367,7 @@
           <p:cNvPr id="57" name="Rounded Rectangle 47">
             <a:extLst>
               <a:ext uri="{FF2B5EF4-FFF2-40B4-BE49-F238E27FC236}">
-                <a16:creationId xmlns:a16="http://schemas.microsoft.com/office/drawing/2014/main" xmlns="" id="{094D318D-7740-40B1-8FDC-752A452D00FC}"/>
+                <a16:creationId xmlns="" xmlns:a16="http://schemas.microsoft.com/office/drawing/2014/main" id="{094D318D-7740-40B1-8FDC-752A452D00FC}"/>
               </a:ext>
             </a:extLst>
           </p:cNvPr>
@@ -12433,7 +12424,7 @@
           <p:cNvPr id="58" name="Rectangle 57">
             <a:extLst>
               <a:ext uri="{FF2B5EF4-FFF2-40B4-BE49-F238E27FC236}">
-                <a16:creationId xmlns:a16="http://schemas.microsoft.com/office/drawing/2014/main" xmlns="" id="{E5A2346C-B437-4A8F-8C2E-BBED9297E0C1}"/>
+                <a16:creationId xmlns="" xmlns:a16="http://schemas.microsoft.com/office/drawing/2014/main" id="{E5A2346C-B437-4A8F-8C2E-BBED9297E0C1}"/>
               </a:ext>
             </a:extLst>
           </p:cNvPr>
@@ -12551,6 +12542,503 @@
               </a:rPr>
               <a:t>:</a:t>
             </a:r>
+          </a:p>
+          <a:p>
+            <a:r>
+              <a:rPr lang="en-US" sz="1600" dirty="0">
+                <a:solidFill>
+                  <a:srgbClr val="000000"/>
+                </a:solidFill>
+                <a:latin typeface="Calibri" panose="020F0502020204030204" pitchFamily="34" charset="0"/>
+              </a:rPr>
+              <a:t> </a:t>
+            </a:r>
+            <a:r>
+              <a:rPr lang="en-US" sz="1600" dirty="0" smtClean="0">
+                <a:solidFill>
+                  <a:srgbClr val="000000"/>
+                </a:solidFill>
+                <a:latin typeface="Calibri" panose="020F0502020204030204" pitchFamily="34" charset="0"/>
+              </a:rPr>
+              <a:t>For </a:t>
+            </a:r>
+            <a:r>
+              <a:rPr lang="en-US" sz="1600" dirty="0">
+                <a:solidFill>
+                  <a:srgbClr val="000000"/>
+                </a:solidFill>
+                <a:latin typeface="Calibri" panose="020F0502020204030204" pitchFamily="34" charset="0"/>
+              </a:rPr>
+              <a:t>a protein sequence, </a:t>
+            </a:r>
+            <a:r>
+              <a:rPr lang="en-US" sz="1600" i="1" dirty="0">
+                <a:solidFill>
+                  <a:srgbClr val="000000"/>
+                </a:solidFill>
+                <a:latin typeface="Calibri" panose="020F0502020204030204" pitchFamily="34" charset="0"/>
+              </a:rPr>
+              <a:t>S = </a:t>
+            </a:r>
+            <a:r>
+              <a:rPr lang="en-US" sz="1600" i="1" dirty="0" smtClean="0">
+                <a:solidFill>
+                  <a:srgbClr val="000000"/>
+                </a:solidFill>
+                <a:latin typeface="Calibri" panose="020F0502020204030204" pitchFamily="34" charset="0"/>
+              </a:rPr>
+              <a:t>{</a:t>
+            </a:r>
+            <a:r>
+              <a:rPr lang="sr-Latn-BA" sz="1600" i="1" dirty="0">
+                <a:solidFill>
+                  <a:srgbClr val="000000"/>
+                </a:solidFill>
+                <a:latin typeface="Calibri" panose="020F0502020204030204" pitchFamily="34" charset="0"/>
+              </a:rPr>
+              <a:t>p</a:t>
+            </a:r>
+            <a:r>
+              <a:rPr lang="en-US" sz="1600" i="1" baseline="-25000" dirty="0" smtClean="0">
+                <a:solidFill>
+                  <a:srgbClr val="000000"/>
+                </a:solidFill>
+                <a:latin typeface="Calibri" panose="020F0502020204030204" pitchFamily="34" charset="0"/>
+              </a:rPr>
+              <a:t>1</a:t>
+            </a:r>
+            <a:r>
+              <a:rPr lang="en-US" sz="1600" i="1" dirty="0">
+                <a:solidFill>
+                  <a:srgbClr val="000000"/>
+                </a:solidFill>
+                <a:latin typeface="Calibri" panose="020F0502020204030204" pitchFamily="34" charset="0"/>
+              </a:rPr>
+              <a:t>, </a:t>
+            </a:r>
+            <a:r>
+              <a:rPr lang="sr-Latn-BA" sz="1600" i="1" dirty="0" smtClean="0">
+                <a:solidFill>
+                  <a:srgbClr val="000000"/>
+                </a:solidFill>
+                <a:latin typeface="Calibri" panose="020F0502020204030204" pitchFamily="34" charset="0"/>
+              </a:rPr>
+              <a:t>p</a:t>
+            </a:r>
+            <a:r>
+              <a:rPr lang="en-US" sz="1600" i="1" baseline="-25000" dirty="0" smtClean="0">
+                <a:solidFill>
+                  <a:srgbClr val="000000"/>
+                </a:solidFill>
+                <a:latin typeface="Calibri" panose="020F0502020204030204" pitchFamily="34" charset="0"/>
+              </a:rPr>
+              <a:t>2</a:t>
+            </a:r>
+            <a:r>
+              <a:rPr lang="en-US" sz="1600" i="1" dirty="0">
+                <a:solidFill>
+                  <a:srgbClr val="000000"/>
+                </a:solidFill>
+                <a:latin typeface="Calibri" panose="020F0502020204030204" pitchFamily="34" charset="0"/>
+              </a:rPr>
+              <a:t>, </a:t>
+            </a:r>
+            <a:r>
+              <a:rPr lang="sr-Latn-BA" sz="1600" i="1" dirty="0" smtClean="0">
+                <a:solidFill>
+                  <a:srgbClr val="000000"/>
+                </a:solidFill>
+                <a:latin typeface="Calibri" panose="020F0502020204030204" pitchFamily="34" charset="0"/>
+              </a:rPr>
+              <a:t>p</a:t>
+            </a:r>
+            <a:r>
+              <a:rPr lang="en-US" sz="1600" i="1" baseline="-25000" dirty="0" smtClean="0">
+                <a:solidFill>
+                  <a:srgbClr val="000000"/>
+                </a:solidFill>
+                <a:latin typeface="Calibri" panose="020F0502020204030204" pitchFamily="34" charset="0"/>
+              </a:rPr>
+              <a:t>3</a:t>
+            </a:r>
+            <a:r>
+              <a:rPr lang="en-US" sz="1600" i="1" dirty="0" smtClean="0">
+                <a:solidFill>
+                  <a:srgbClr val="000000"/>
+                </a:solidFill>
+                <a:latin typeface="Calibri" panose="020F0502020204030204" pitchFamily="34" charset="0"/>
+              </a:rPr>
+              <a:t>,…,</a:t>
+            </a:r>
+            <a:r>
+              <a:rPr lang="sr-Latn-BA" sz="1600" i="1" dirty="0" err="1">
+                <a:solidFill>
+                  <a:srgbClr val="000000"/>
+                </a:solidFill>
+                <a:latin typeface="Calibri" panose="020F0502020204030204" pitchFamily="34" charset="0"/>
+              </a:rPr>
+              <a:t>p</a:t>
+            </a:r>
+            <a:r>
+              <a:rPr lang="en-US" sz="1600" i="1" baseline="-25000" dirty="0" smtClean="0">
+                <a:solidFill>
+                  <a:srgbClr val="000000"/>
+                </a:solidFill>
+                <a:latin typeface="Calibri" panose="020F0502020204030204" pitchFamily="34" charset="0"/>
+              </a:rPr>
+              <a:t>N</a:t>
+            </a:r>
+            <a:r>
+              <a:rPr lang="en-US" sz="1600" i="1" dirty="0">
+                <a:solidFill>
+                  <a:srgbClr val="000000"/>
+                </a:solidFill>
+                <a:latin typeface="Calibri" panose="020F0502020204030204" pitchFamily="34" charset="0"/>
+              </a:rPr>
+              <a:t>)</a:t>
+            </a:r>
+            <a:r>
+              <a:rPr lang="en-US" sz="1600" dirty="0">
+                <a:solidFill>
+                  <a:srgbClr val="000000"/>
+                </a:solidFill>
+                <a:latin typeface="Calibri" panose="020F0502020204030204" pitchFamily="34" charset="0"/>
+              </a:rPr>
+              <a:t>, where </a:t>
+            </a:r>
+            <a:r>
+              <a:rPr lang="sr-Latn-BA" sz="1600" i="1" dirty="0">
+                <a:solidFill>
+                  <a:srgbClr val="000000"/>
+                </a:solidFill>
+                <a:latin typeface="Calibri" panose="020F0502020204030204" pitchFamily="34" charset="0"/>
+              </a:rPr>
+              <a:t>p</a:t>
+            </a:r>
+            <a:r>
+              <a:rPr lang="en-US" sz="1600" i="1" baseline="-25000" dirty="0">
+                <a:solidFill>
+                  <a:srgbClr val="000000"/>
+                </a:solidFill>
+                <a:latin typeface="Calibri" panose="020F0502020204030204" pitchFamily="34" charset="0"/>
+              </a:rPr>
+              <a:t>1</a:t>
+            </a:r>
+            <a:r>
+              <a:rPr lang="en-US" sz="1600" i="1" dirty="0">
+                <a:solidFill>
+                  <a:srgbClr val="000000"/>
+                </a:solidFill>
+                <a:latin typeface="Calibri" panose="020F0502020204030204" pitchFamily="34" charset="0"/>
+              </a:rPr>
+              <a:t>, </a:t>
+            </a:r>
+            <a:r>
+              <a:rPr lang="sr-Latn-BA" sz="1600" i="1" dirty="0">
+                <a:solidFill>
+                  <a:srgbClr val="000000"/>
+                </a:solidFill>
+                <a:latin typeface="Calibri" panose="020F0502020204030204" pitchFamily="34" charset="0"/>
+              </a:rPr>
+              <a:t>p</a:t>
+            </a:r>
+            <a:r>
+              <a:rPr lang="en-US" sz="1600" i="1" baseline="-25000" dirty="0" smtClean="0">
+                <a:solidFill>
+                  <a:srgbClr val="000000"/>
+                </a:solidFill>
+                <a:latin typeface="Calibri" panose="020F0502020204030204" pitchFamily="34" charset="0"/>
+              </a:rPr>
+              <a:t>2</a:t>
+            </a:r>
+            <a:r>
+              <a:rPr lang="sr-Latn-BA" sz="1600" dirty="0" smtClean="0">
+                <a:solidFill>
+                  <a:srgbClr val="000000"/>
+                </a:solidFill>
+                <a:latin typeface="Calibri" panose="020F0502020204030204" pitchFamily="34" charset="0"/>
+              </a:rPr>
+              <a:t>,</a:t>
+            </a:r>
+            <a:r>
+              <a:rPr lang="en-US" sz="1600" i="1" dirty="0">
+                <a:solidFill>
+                  <a:srgbClr val="000000"/>
+                </a:solidFill>
+                <a:latin typeface="Calibri" panose="020F0502020204030204" pitchFamily="34" charset="0"/>
+              </a:rPr>
+              <a:t> …,</a:t>
+            </a:r>
+            <a:r>
+              <a:rPr lang="sr-Latn-BA" sz="1600" i="1" dirty="0">
+                <a:solidFill>
+                  <a:srgbClr val="000000"/>
+                </a:solidFill>
+                <a:latin typeface="Calibri" panose="020F0502020204030204" pitchFamily="34" charset="0"/>
+              </a:rPr>
+              <a:t>p</a:t>
+            </a:r>
+            <a:r>
+              <a:rPr lang="en-US" sz="1600" i="1" baseline="-25000" dirty="0">
+                <a:solidFill>
+                  <a:srgbClr val="000000"/>
+                </a:solidFill>
+                <a:latin typeface="Calibri" panose="020F0502020204030204" pitchFamily="34" charset="0"/>
+              </a:rPr>
+              <a:t>N</a:t>
+            </a:r>
+            <a:r>
+              <a:rPr lang="en-US" sz="1600" dirty="0" smtClean="0">
+                <a:solidFill>
+                  <a:srgbClr val="000000"/>
+                </a:solidFill>
+                <a:latin typeface="Calibri" panose="020F0502020204030204" pitchFamily="34" charset="0"/>
+              </a:rPr>
+              <a:t> </a:t>
+            </a:r>
+            <a:r>
+              <a:rPr lang="en-US" sz="1600" dirty="0">
+                <a:solidFill>
+                  <a:srgbClr val="000000"/>
+                </a:solidFill>
+                <a:latin typeface="Calibri" panose="020F0502020204030204" pitchFamily="34" charset="0"/>
+              </a:rPr>
+              <a:t>are the successive residues, </a:t>
+            </a:r>
+            <a:r>
+              <a:rPr lang="en-US" sz="1600" dirty="0" smtClean="0">
+                <a:solidFill>
+                  <a:srgbClr val="000000"/>
+                </a:solidFill>
+                <a:latin typeface="Calibri" panose="020F0502020204030204" pitchFamily="34" charset="0"/>
+              </a:rPr>
+              <a:t>      calculate </a:t>
+            </a:r>
+            <a:r>
+              <a:rPr lang="en-US" sz="1600" dirty="0">
+                <a:solidFill>
+                  <a:srgbClr val="000000"/>
+                </a:solidFill>
+                <a:latin typeface="Calibri" panose="020F0502020204030204" pitchFamily="34" charset="0"/>
+              </a:rPr>
+              <a:t>the binary sequence, </a:t>
+            </a:r>
+            <a:r>
+              <a:rPr lang="sr-Latn-BA" sz="1600" i="1" dirty="0">
+                <a:solidFill>
+                  <a:srgbClr val="000000"/>
+                </a:solidFill>
+                <a:latin typeface="Calibri" panose="020F0502020204030204" pitchFamily="34" charset="0"/>
+              </a:rPr>
+              <a:t>F</a:t>
+            </a:r>
+            <a:r>
+              <a:rPr lang="en-US" sz="1600" i="1" dirty="0" smtClean="0">
+                <a:solidFill>
+                  <a:srgbClr val="000000"/>
+                </a:solidFill>
+                <a:latin typeface="Calibri" panose="020F0502020204030204" pitchFamily="34" charset="0"/>
+              </a:rPr>
+              <a:t>(S</a:t>
+            </a:r>
+            <a:r>
+              <a:rPr lang="en-US" sz="1600" i="1" dirty="0">
+                <a:solidFill>
+                  <a:srgbClr val="000000"/>
+                </a:solidFill>
+                <a:latin typeface="Calibri" panose="020F0502020204030204" pitchFamily="34" charset="0"/>
+              </a:rPr>
+              <a:t>)</a:t>
+            </a:r>
+            <a:r>
+              <a:rPr lang="en-US" sz="1600" dirty="0">
+                <a:solidFill>
+                  <a:srgbClr val="000000"/>
+                </a:solidFill>
+                <a:latin typeface="Calibri" panose="020F0502020204030204" pitchFamily="34" charset="0"/>
+              </a:rPr>
+              <a:t> through an indicator </a:t>
+            </a:r>
+            <a:r>
+              <a:rPr lang="en-US" sz="1600" dirty="0" smtClean="0">
+                <a:solidFill>
+                  <a:srgbClr val="000000"/>
+                </a:solidFill>
+                <a:latin typeface="Calibri" panose="020F0502020204030204" pitchFamily="34" charset="0"/>
+              </a:rPr>
+              <a:t>function </a:t>
+            </a:r>
+            <a:r>
+              <a:rPr lang="en-US" sz="1600" i="1" dirty="0">
+                <a:solidFill>
+                  <a:srgbClr val="000000"/>
+                </a:solidFill>
+                <a:latin typeface="Calibri" panose="020F0502020204030204" pitchFamily="34" charset="0"/>
+              </a:rPr>
+              <a:t>f</a:t>
+            </a:r>
+            <a:r>
+              <a:rPr lang="en-US" sz="1600" dirty="0">
+                <a:solidFill>
+                  <a:srgbClr val="000000"/>
+                </a:solidFill>
+                <a:latin typeface="Calibri" panose="020F0502020204030204" pitchFamily="34" charset="0"/>
+              </a:rPr>
+              <a:t>, </a:t>
+            </a:r>
+            <a:r>
+              <a:rPr lang="en-US" sz="1600" dirty="0" smtClean="0">
+                <a:solidFill>
+                  <a:srgbClr val="000000"/>
+                </a:solidFill>
+                <a:latin typeface="Calibri" panose="020F0502020204030204" pitchFamily="34" charset="0"/>
+              </a:rPr>
+              <a:t>as </a:t>
+            </a:r>
+            <a:r>
+              <a:rPr lang="sr-Latn-BA" sz="1600" dirty="0" smtClean="0">
+                <a:solidFill>
+                  <a:srgbClr val="000000"/>
+                </a:solidFill>
+                <a:latin typeface="Calibri" panose="020F0502020204030204" pitchFamily="34" charset="0"/>
+              </a:rPr>
+              <a:t>F</a:t>
+            </a:r>
+            <a:r>
+              <a:rPr lang="en-US" sz="1600" dirty="0" smtClean="0">
+                <a:solidFill>
+                  <a:srgbClr val="000000"/>
+                </a:solidFill>
+                <a:latin typeface="Calibri" panose="020F0502020204030204" pitchFamily="34" charset="0"/>
+              </a:rPr>
+              <a:t>(</a:t>
+            </a:r>
+            <a:r>
+              <a:rPr lang="sr-Latn-BA" sz="1600" dirty="0" smtClean="0">
+                <a:solidFill>
+                  <a:srgbClr val="000000"/>
+                </a:solidFill>
+                <a:latin typeface="Calibri" panose="020F0502020204030204" pitchFamily="34" charset="0"/>
+              </a:rPr>
+              <a:t>S</a:t>
+            </a:r>
+            <a:r>
+              <a:rPr lang="en-US" sz="1600" dirty="0" smtClean="0">
+                <a:solidFill>
+                  <a:srgbClr val="000000"/>
+                </a:solidFill>
+                <a:latin typeface="Calibri" panose="020F0502020204030204" pitchFamily="34" charset="0"/>
+              </a:rPr>
+              <a:t>)={</a:t>
+            </a:r>
+            <a:r>
+              <a:rPr lang="en-US" sz="1600" i="1" dirty="0" smtClean="0">
+                <a:solidFill>
+                  <a:srgbClr val="000000"/>
+                </a:solidFill>
+                <a:latin typeface="Calibri" panose="020F0502020204030204" pitchFamily="34" charset="0"/>
+              </a:rPr>
+              <a:t>f(</a:t>
+            </a:r>
+            <a:r>
+              <a:rPr lang="sr-Latn-BA" sz="1600" i="1" dirty="0">
+                <a:solidFill>
+                  <a:srgbClr val="000000"/>
+                </a:solidFill>
+                <a:latin typeface="Calibri" panose="020F0502020204030204" pitchFamily="34" charset="0"/>
+              </a:rPr>
+              <a:t>p</a:t>
+            </a:r>
+            <a:r>
+              <a:rPr lang="en-US" sz="1600" i="1" baseline="-25000" dirty="0">
+                <a:solidFill>
+                  <a:srgbClr val="000000"/>
+                </a:solidFill>
+                <a:latin typeface="Calibri" panose="020F0502020204030204" pitchFamily="34" charset="0"/>
+              </a:rPr>
+              <a:t>1</a:t>
+            </a:r>
+            <a:r>
+              <a:rPr lang="en-US" sz="1600" i="1" dirty="0" smtClean="0">
+                <a:solidFill>
+                  <a:srgbClr val="000000"/>
+                </a:solidFill>
+                <a:latin typeface="Calibri" panose="020F0502020204030204" pitchFamily="34" charset="0"/>
+              </a:rPr>
+              <a:t>),f(</a:t>
+            </a:r>
+            <a:r>
+              <a:rPr lang="sr-Latn-BA" sz="1600" i="1" dirty="0">
+                <a:solidFill>
+                  <a:srgbClr val="000000"/>
+                </a:solidFill>
+                <a:latin typeface="Calibri" panose="020F0502020204030204" pitchFamily="34" charset="0"/>
+              </a:rPr>
+              <a:t>p</a:t>
+            </a:r>
+            <a:r>
+              <a:rPr lang="en-US" sz="1600" i="1" baseline="-25000" dirty="0">
+                <a:solidFill>
+                  <a:srgbClr val="000000"/>
+                </a:solidFill>
+                <a:latin typeface="Calibri" panose="020F0502020204030204" pitchFamily="34" charset="0"/>
+              </a:rPr>
+              <a:t>2</a:t>
+            </a:r>
+            <a:r>
+              <a:rPr lang="en-US" sz="1600" i="1" dirty="0" smtClean="0">
+                <a:solidFill>
+                  <a:srgbClr val="000000"/>
+                </a:solidFill>
+                <a:latin typeface="Calibri" panose="020F0502020204030204" pitchFamily="34" charset="0"/>
+              </a:rPr>
+              <a:t>)</a:t>
+            </a:r>
+            <a:r>
+              <a:rPr lang="en-US" sz="1600" dirty="0" smtClean="0">
+                <a:solidFill>
+                  <a:srgbClr val="000000"/>
+                </a:solidFill>
+                <a:latin typeface="Calibri" panose="020F0502020204030204" pitchFamily="34" charset="0"/>
+              </a:rPr>
+              <a:t>,…,</a:t>
+            </a:r>
+            <a:r>
+              <a:rPr lang="sr-Latn-BA" sz="1600" i="1" dirty="0" smtClean="0">
+                <a:solidFill>
+                  <a:srgbClr val="000000"/>
+                </a:solidFill>
+                <a:latin typeface="Calibri" panose="020F0502020204030204" pitchFamily="34" charset="0"/>
+              </a:rPr>
+              <a:t> f(p</a:t>
+            </a:r>
+            <a:r>
+              <a:rPr lang="en-US" sz="1600" i="1" baseline="-25000" dirty="0" smtClean="0">
+                <a:solidFill>
+                  <a:srgbClr val="000000"/>
+                </a:solidFill>
+                <a:latin typeface="Calibri" panose="020F0502020204030204" pitchFamily="34" charset="0"/>
+              </a:rPr>
+              <a:t>N</a:t>
+            </a:r>
+            <a:r>
+              <a:rPr lang="sr-Latn-BA" sz="1600" dirty="0" smtClean="0">
+                <a:solidFill>
+                  <a:srgbClr val="000000"/>
+                </a:solidFill>
+                <a:latin typeface="Calibri" panose="020F0502020204030204" pitchFamily="34" charset="0"/>
+              </a:rPr>
+              <a:t>)</a:t>
+            </a:r>
+            <a:r>
+              <a:rPr lang="en-US" sz="1600" dirty="0" smtClean="0">
+                <a:solidFill>
+                  <a:srgbClr val="000000"/>
+                </a:solidFill>
+                <a:latin typeface="Calibri" panose="020F0502020204030204" pitchFamily="34" charset="0"/>
+              </a:rPr>
+              <a:t>}</a:t>
+            </a:r>
             <a:endParaRPr lang="en-US" sz="1600" dirty="0">
               <a:solidFill>
                 <a:srgbClr val="000000"/>
@@ -12566,16 +13054,144 @@
                 </a:solidFill>
                 <a:latin typeface="Calibri" panose="020F0502020204030204" pitchFamily="34" charset="0"/>
               </a:rPr>
+              <a:t>where, </a:t>
+            </a:r>
+            <a:r>
+              <a:rPr lang="en-US" sz="1600" i="1" dirty="0">
+                <a:solidFill>
+                  <a:srgbClr val="000000"/>
+                </a:solidFill>
+                <a:latin typeface="Calibri" panose="020F0502020204030204" pitchFamily="34" charset="0"/>
+              </a:rPr>
+              <a:t>f(</a:t>
+            </a:r>
+            <a:r>
+              <a:rPr lang="sr-Latn-BA" sz="1600" i="1" dirty="0" smtClean="0">
+                <a:solidFill>
+                  <a:srgbClr val="000000"/>
+                </a:solidFill>
+                <a:latin typeface="Calibri" panose="020F0502020204030204" pitchFamily="34" charset="0"/>
+              </a:rPr>
+              <a:t>p</a:t>
+            </a:r>
+            <a:r>
+              <a:rPr lang="sr-Latn-BA" sz="1600" i="1" baseline="-25000" dirty="0" smtClean="0">
+                <a:solidFill>
+                  <a:srgbClr val="000000"/>
+                </a:solidFill>
+                <a:latin typeface="Calibri" panose="020F0502020204030204" pitchFamily="34" charset="0"/>
+              </a:rPr>
+              <a:t>j</a:t>
+            </a:r>
+            <a:r>
+              <a:rPr lang="en-US" sz="1600" i="1" dirty="0" smtClean="0">
+                <a:solidFill>
+                  <a:srgbClr val="000000"/>
+                </a:solidFill>
+                <a:latin typeface="Calibri" panose="020F0502020204030204" pitchFamily="34" charset="0"/>
+              </a:rPr>
+              <a:t>)</a:t>
+            </a:r>
+            <a:r>
+              <a:rPr lang="en-US" sz="1600" dirty="0" smtClean="0">
+                <a:solidFill>
+                  <a:srgbClr val="000000"/>
+                </a:solidFill>
+                <a:latin typeface="Calibri" panose="020F0502020204030204" pitchFamily="34" charset="0"/>
+              </a:rPr>
               <a:t> </a:t>
             </a:r>
             <a:r>
+              <a:rPr lang="en-US" sz="1600" dirty="0">
+                <a:solidFill>
+                  <a:srgbClr val="000000"/>
+                </a:solidFill>
+                <a:latin typeface="Calibri" panose="020F0502020204030204" pitchFamily="34" charset="0"/>
+              </a:rPr>
+              <a:t>= 1 if </a:t>
+            </a:r>
+            <a:r>
+              <a:rPr lang="sr-Latn-BA" sz="1600" i="1" dirty="0" smtClean="0">
+                <a:solidFill>
+                  <a:srgbClr val="000000"/>
+                </a:solidFill>
+                <a:latin typeface="Calibri" panose="020F0502020204030204" pitchFamily="34" charset="0"/>
+              </a:rPr>
+              <a:t>p</a:t>
+            </a:r>
+            <a:r>
+              <a:rPr lang="sr-Latn-BA" sz="1600" i="1" baseline="-25000" dirty="0" smtClean="0">
+                <a:solidFill>
+                  <a:srgbClr val="000000"/>
+                </a:solidFill>
+                <a:latin typeface="Calibri" panose="020F0502020204030204" pitchFamily="34" charset="0"/>
+              </a:rPr>
+              <a:t>j</a:t>
+            </a:r>
+            <a:r>
               <a:rPr lang="en-US" sz="1600" dirty="0" smtClean="0">
                 <a:solidFill>
                   <a:srgbClr val="000000"/>
                 </a:solidFill>
                 <a:latin typeface="Calibri" panose="020F0502020204030204" pitchFamily="34" charset="0"/>
               </a:rPr>
-              <a:t>F</a:t>
+              <a:t> </a:t>
+            </a:r>
+            <a:r>
+              <a:rPr lang="en-US" sz="1600" dirty="0">
+                <a:solidFill>
+                  <a:srgbClr val="000000"/>
+                </a:solidFill>
+                <a:latin typeface="Calibri" panose="020F0502020204030204" pitchFamily="34" charset="0"/>
+              </a:rPr>
+              <a:t>has the property </a:t>
+            </a:r>
+            <a:r>
+              <a:rPr lang="en-US" sz="1600" i="1" dirty="0">
+                <a:solidFill>
+                  <a:srgbClr val="000000"/>
+                </a:solidFill>
+                <a:latin typeface="Calibri" panose="020F0502020204030204" pitchFamily="34" charset="0"/>
+              </a:rPr>
+              <a:t>prop</a:t>
+            </a:r>
+            <a:r>
+              <a:rPr lang="en-US" sz="1600" dirty="0">
+                <a:solidFill>
+                  <a:srgbClr val="000000"/>
+                </a:solidFill>
+                <a:latin typeface="Calibri" panose="020F0502020204030204" pitchFamily="34" charset="0"/>
+              </a:rPr>
+              <a:t>.</a:t>
+            </a:r>
+          </a:p>
+          <a:p>
+            <a:r>
+              <a:rPr lang="en-US" sz="1600" dirty="0">
+                <a:solidFill>
+                  <a:srgbClr val="000000"/>
+                </a:solidFill>
+                <a:latin typeface="Calibri" panose="020F0502020204030204" pitchFamily="34" charset="0"/>
+              </a:rPr>
+              <a:t>Calculate two inter-arrival distances (IADs) array for successive residues i.e. determine the distance between two successive residues: (</a:t>
+            </a:r>
+            <a:r>
+              <a:rPr lang="en-US" sz="1600" i="1" dirty="0">
+                <a:solidFill>
+                  <a:srgbClr val="000000"/>
+                </a:solidFill>
+                <a:latin typeface="Calibri" panose="020F0502020204030204" pitchFamily="34" charset="0"/>
+              </a:rPr>
+              <a:t>array1</a:t>
+            </a:r>
+            <a:r>
+              <a:rPr lang="en-US" sz="1600" dirty="0">
+                <a:solidFill>
+                  <a:srgbClr val="000000"/>
+                </a:solidFill>
+                <a:latin typeface="Calibri" panose="020F0502020204030204" pitchFamily="34" charset="0"/>
+              </a:rPr>
+              <a:t>) </a:t>
             </a:r>
             <a:r>
               <a:rPr lang="en-US" sz="1600" dirty="0" smtClean="0">
@@ -12584,7 +13200,7 @@
                 </a:solidFill>
                 <a:latin typeface="Calibri" panose="020F0502020204030204" pitchFamily="34" charset="0"/>
               </a:rPr>
-              <a:t>or </a:t>
+              <a:t>distances between ones, and </a:t>
             </a:r>
             <a:r>
               <a:rPr lang="en-US" sz="1600" dirty="0">
@@ -12593,7 +13209,7 @@
                 </a:solidFill>
                 <a:latin typeface="Calibri" panose="020F0502020204030204" pitchFamily="34" charset="0"/>
               </a:rPr>
-              <a:t>a protein sequence, </a:t>
+              <a:t>(</a:t>
             </a:r>
             <a:r>
               <a:rPr lang="en-US" sz="1600" i="1" dirty="0">
@@ -12602,674 +13218,16 @@
                 </a:solidFill>
                 <a:latin typeface="Calibri" panose="020F0502020204030204" pitchFamily="34" charset="0"/>
               </a:rPr>
-              <a:t>S = </a:t>
-            </a:r>
-            <a:r>
-              <a:rPr lang="en-US" sz="1600" i="1" dirty="0" smtClean="0">
+              <a:t>array2</a:t>
+            </a:r>
+            <a:r>
+              <a:rPr lang="en-US" sz="1600" dirty="0">
                 <a:solidFill>
                   <a:srgbClr val="000000"/>
                 </a:solidFill>
                 <a:latin typeface="Calibri" panose="020F0502020204030204" pitchFamily="34" charset="0"/>
               </a:rPr>
-              <a:t>{</a:t>
-            </a:r>
-            <a:r>
-              <a:rPr lang="sr-Latn-BA" sz="1600" i="1" dirty="0">
-                <a:solidFill>
-                  <a:srgbClr val="000000"/>
-                </a:solidFill>
-                <a:latin typeface="Calibri" panose="020F0502020204030204" pitchFamily="34" charset="0"/>
-              </a:rPr>
-              <a:t>p</a:t>
-            </a:r>
-            <a:r>
-              <a:rPr lang="en-US" sz="1600" i="1" baseline="-25000" dirty="0" smtClean="0">
-                <a:solidFill>
-                  <a:srgbClr val="000000"/>
-                </a:solidFill>
-                <a:latin typeface="Calibri" panose="020F0502020204030204" pitchFamily="34" charset="0"/>
-              </a:rPr>
-              <a:t>1</a:t>
-            </a:r>
-            <a:r>
-              <a:rPr lang="en-US" sz="1600" i="1" dirty="0">
-                <a:solidFill>
-                  <a:srgbClr val="000000"/>
-                </a:solidFill>
-                <a:latin typeface="Calibri" panose="020F0502020204030204" pitchFamily="34" charset="0"/>
-              </a:rPr>
-              <a:t>, </a:t>
-            </a:r>
-            <a:r>
-              <a:rPr lang="sr-Latn-BA" sz="1600" i="1" dirty="0" smtClean="0">
-                <a:solidFill>
-                  <a:srgbClr val="000000"/>
-                </a:solidFill>
-                <a:latin typeface="Calibri" panose="020F0502020204030204" pitchFamily="34" charset="0"/>
-              </a:rPr>
-              <a:t>p</a:t>
-            </a:r>
-            <a:r>
-              <a:rPr lang="en-US" sz="1600" i="1" baseline="-25000" dirty="0" smtClean="0">
-                <a:solidFill>
-                  <a:srgbClr val="000000"/>
-                </a:solidFill>
-                <a:latin typeface="Calibri" panose="020F0502020204030204" pitchFamily="34" charset="0"/>
-              </a:rPr>
-              <a:t>2</a:t>
-            </a:r>
-            <a:r>
-              <a:rPr lang="en-US" sz="1600" i="1" dirty="0">
-                <a:solidFill>
-                  <a:srgbClr val="000000"/>
-                </a:solidFill>
-                <a:latin typeface="Calibri" panose="020F0502020204030204" pitchFamily="34" charset="0"/>
-              </a:rPr>
-              <a:t>, </a:t>
-            </a:r>
-            <a:r>
-              <a:rPr lang="sr-Latn-BA" sz="1600" i="1" dirty="0" smtClean="0">
-                <a:solidFill>
-                  <a:srgbClr val="000000"/>
-                </a:solidFill>
-                <a:latin typeface="Calibri" panose="020F0502020204030204" pitchFamily="34" charset="0"/>
-              </a:rPr>
-              <a:t>p</a:t>
-            </a:r>
-            <a:r>
-              <a:rPr lang="en-US" sz="1600" i="1" baseline="-25000" dirty="0" smtClean="0">
-                <a:solidFill>
-                  <a:srgbClr val="000000"/>
-                </a:solidFill>
-                <a:latin typeface="Calibri" panose="020F0502020204030204" pitchFamily="34" charset="0"/>
-              </a:rPr>
-              <a:t>3</a:t>
-            </a:r>
-            <a:r>
-              <a:rPr lang="en-US" sz="1600" i="1" dirty="0" smtClean="0">
-                <a:solidFill>
-                  <a:srgbClr val="000000"/>
-                </a:solidFill>
-                <a:latin typeface="Calibri" panose="020F0502020204030204" pitchFamily="34" charset="0"/>
-              </a:rPr>
-              <a:t>,…,</a:t>
-            </a:r>
-            <a:r>
-              <a:rPr lang="sr-Latn-BA" sz="1600" i="1" dirty="0" err="1">
-                <a:solidFill>
-                  <a:srgbClr val="000000"/>
-                </a:solidFill>
-                <a:latin typeface="Calibri" panose="020F0502020204030204" pitchFamily="34" charset="0"/>
-              </a:rPr>
-              <a:t>p</a:t>
-            </a:r>
-            <a:r>
-              <a:rPr lang="en-US" sz="1600" i="1" baseline="-25000" dirty="0" smtClean="0">
-                <a:solidFill>
-                  <a:srgbClr val="000000"/>
-                </a:solidFill>
-                <a:latin typeface="Calibri" panose="020F0502020204030204" pitchFamily="34" charset="0"/>
-              </a:rPr>
-              <a:t>N</a:t>
-            </a:r>
-            <a:r>
-              <a:rPr lang="en-US" sz="1600" i="1" dirty="0">
-                <a:solidFill>
-                  <a:srgbClr val="000000"/>
-                </a:solidFill>
-                <a:latin typeface="Calibri" panose="020F0502020204030204" pitchFamily="34" charset="0"/>
-              </a:rPr>
-              <a:t>)</a:t>
-            </a:r>
-            <a:r>
-              <a:rPr lang="en-US" sz="1600" dirty="0">
-                <a:solidFill>
-                  <a:srgbClr val="000000"/>
-                </a:solidFill>
-                <a:latin typeface="Calibri" panose="020F0502020204030204" pitchFamily="34" charset="0"/>
-              </a:rPr>
-              <a:t>, where </a:t>
-            </a:r>
-            <a:r>
-              <a:rPr lang="sr-Latn-BA" sz="1600" i="1" dirty="0">
-                <a:solidFill>
-                  <a:srgbClr val="000000"/>
-                </a:solidFill>
-                <a:latin typeface="Calibri" panose="020F0502020204030204" pitchFamily="34" charset="0"/>
-              </a:rPr>
-              <a:t>p</a:t>
-            </a:r>
-            <a:r>
-              <a:rPr lang="en-US" sz="1600" i="1" baseline="-25000" dirty="0">
-                <a:solidFill>
-                  <a:srgbClr val="000000"/>
-                </a:solidFill>
-                <a:latin typeface="Calibri" panose="020F0502020204030204" pitchFamily="34" charset="0"/>
-              </a:rPr>
-              <a:t>1</a:t>
-            </a:r>
-            <a:r>
-              <a:rPr lang="en-US" sz="1600" i="1" dirty="0">
-                <a:solidFill>
-                  <a:srgbClr val="000000"/>
-                </a:solidFill>
-                <a:latin typeface="Calibri" panose="020F0502020204030204" pitchFamily="34" charset="0"/>
-              </a:rPr>
-              <a:t>, </a:t>
-            </a:r>
-            <a:r>
-              <a:rPr lang="sr-Latn-BA" sz="1600" i="1" dirty="0">
-                <a:solidFill>
-                  <a:srgbClr val="000000"/>
-                </a:solidFill>
-                <a:latin typeface="Calibri" panose="020F0502020204030204" pitchFamily="34" charset="0"/>
-              </a:rPr>
-              <a:t>p</a:t>
-            </a:r>
-            <a:r>
-              <a:rPr lang="en-US" sz="1600" i="1" baseline="-25000" dirty="0" smtClean="0">
-                <a:solidFill>
-                  <a:srgbClr val="000000"/>
-                </a:solidFill>
-                <a:latin typeface="Calibri" panose="020F0502020204030204" pitchFamily="34" charset="0"/>
-              </a:rPr>
-              <a:t>2</a:t>
-            </a:r>
-            <a:r>
-              <a:rPr lang="sr-Latn-BA" sz="1600" dirty="0" smtClean="0">
-                <a:solidFill>
-                  <a:srgbClr val="000000"/>
-                </a:solidFill>
-                <a:latin typeface="Calibri" panose="020F0502020204030204" pitchFamily="34" charset="0"/>
-              </a:rPr>
-              <a:t>,</a:t>
-            </a:r>
-            <a:r>
-              <a:rPr lang="en-US" sz="1600" i="1" dirty="0">
-                <a:solidFill>
-                  <a:srgbClr val="000000"/>
-                </a:solidFill>
-                <a:latin typeface="Calibri" panose="020F0502020204030204" pitchFamily="34" charset="0"/>
-              </a:rPr>
-              <a:t> …,</a:t>
-            </a:r>
-            <a:r>
-              <a:rPr lang="sr-Latn-BA" sz="1600" i="1" dirty="0">
-                <a:solidFill>
-                  <a:srgbClr val="000000"/>
-                </a:solidFill>
-                <a:latin typeface="Calibri" panose="020F0502020204030204" pitchFamily="34" charset="0"/>
-              </a:rPr>
-              <a:t>p</a:t>
-            </a:r>
-            <a:r>
-              <a:rPr lang="en-US" sz="1600" i="1" baseline="-25000" dirty="0">
-                <a:solidFill>
-                  <a:srgbClr val="000000"/>
-                </a:solidFill>
-                <a:latin typeface="Calibri" panose="020F0502020204030204" pitchFamily="34" charset="0"/>
-              </a:rPr>
-              <a:t>N</a:t>
-            </a:r>
-            <a:r>
-              <a:rPr lang="en-US" sz="1600" dirty="0" smtClean="0">
-                <a:solidFill>
-                  <a:srgbClr val="000000"/>
-                </a:solidFill>
-                <a:latin typeface="Calibri" panose="020F0502020204030204" pitchFamily="34" charset="0"/>
-              </a:rPr>
-              <a:t> </a:t>
-            </a:r>
-            <a:r>
-              <a:rPr lang="en-US" sz="1600" dirty="0">
-                <a:solidFill>
-                  <a:srgbClr val="000000"/>
-                </a:solidFill>
-                <a:latin typeface="Calibri" panose="020F0502020204030204" pitchFamily="34" charset="0"/>
-              </a:rPr>
-              <a:t>are the successive residues, </a:t>
-            </a:r>
-            <a:r>
-              <a:rPr lang="en-US" sz="1600" dirty="0" smtClean="0">
-                <a:solidFill>
-                  <a:srgbClr val="000000"/>
-                </a:solidFill>
-                <a:latin typeface="Calibri" panose="020F0502020204030204" pitchFamily="34" charset="0"/>
-              </a:rPr>
-              <a:t>      calculate </a:t>
-            </a:r>
-            <a:r>
-              <a:rPr lang="en-US" sz="1600" dirty="0">
-                <a:solidFill>
-                  <a:srgbClr val="000000"/>
-                </a:solidFill>
-                <a:latin typeface="Calibri" panose="020F0502020204030204" pitchFamily="34" charset="0"/>
-              </a:rPr>
-              <a:t>the binary sequence, </a:t>
-            </a:r>
-            <a:r>
-              <a:rPr lang="sr-Latn-BA" sz="1600" i="1" dirty="0">
-                <a:solidFill>
-                  <a:srgbClr val="000000"/>
-                </a:solidFill>
-                <a:latin typeface="Calibri" panose="020F0502020204030204" pitchFamily="34" charset="0"/>
-              </a:rPr>
-              <a:t>F</a:t>
-            </a:r>
-            <a:r>
-              <a:rPr lang="en-US" sz="1600" i="1" dirty="0" smtClean="0">
-                <a:solidFill>
-                  <a:srgbClr val="000000"/>
-                </a:solidFill>
-                <a:latin typeface="Calibri" panose="020F0502020204030204" pitchFamily="34" charset="0"/>
-              </a:rPr>
-              <a:t>(S</a:t>
-            </a:r>
-            <a:r>
-              <a:rPr lang="en-US" sz="1600" i="1" dirty="0">
-                <a:solidFill>
-                  <a:srgbClr val="000000"/>
-                </a:solidFill>
-                <a:latin typeface="Calibri" panose="020F0502020204030204" pitchFamily="34" charset="0"/>
-              </a:rPr>
-              <a:t>)</a:t>
-            </a:r>
-            <a:r>
-              <a:rPr lang="en-US" sz="1600" dirty="0">
-                <a:solidFill>
-                  <a:srgbClr val="000000"/>
-                </a:solidFill>
-                <a:latin typeface="Calibri" panose="020F0502020204030204" pitchFamily="34" charset="0"/>
-              </a:rPr>
-              <a:t> through an indicator </a:t>
-            </a:r>
-            <a:r>
-              <a:rPr lang="en-US" sz="1600" dirty="0" smtClean="0">
-                <a:solidFill>
-                  <a:srgbClr val="000000"/>
-                </a:solidFill>
-                <a:latin typeface="Calibri" panose="020F0502020204030204" pitchFamily="34" charset="0"/>
-              </a:rPr>
-              <a:t>function </a:t>
-            </a:r>
-            <a:r>
-              <a:rPr lang="en-US" sz="1600" i="1" dirty="0">
-                <a:solidFill>
-                  <a:srgbClr val="000000"/>
-                </a:solidFill>
-                <a:latin typeface="Calibri" panose="020F0502020204030204" pitchFamily="34" charset="0"/>
-              </a:rPr>
-              <a:t>f</a:t>
-            </a:r>
-            <a:r>
-              <a:rPr lang="en-US" sz="1600" dirty="0">
-                <a:solidFill>
-                  <a:srgbClr val="000000"/>
-                </a:solidFill>
-                <a:latin typeface="Calibri" panose="020F0502020204030204" pitchFamily="34" charset="0"/>
-              </a:rPr>
-              <a:t>, </a:t>
-            </a:r>
-            <a:r>
-              <a:rPr lang="en-US" sz="1600" dirty="0" smtClean="0">
-                <a:solidFill>
-                  <a:srgbClr val="000000"/>
-                </a:solidFill>
-                <a:latin typeface="Calibri" panose="020F0502020204030204" pitchFamily="34" charset="0"/>
-              </a:rPr>
-              <a:t>as </a:t>
-            </a:r>
-            <a:r>
-              <a:rPr lang="sr-Latn-BA" sz="1600" dirty="0" smtClean="0">
-                <a:solidFill>
-                  <a:srgbClr val="000000"/>
-                </a:solidFill>
-                <a:latin typeface="Calibri" panose="020F0502020204030204" pitchFamily="34" charset="0"/>
-              </a:rPr>
-              <a:t>F</a:t>
-            </a:r>
-            <a:r>
-              <a:rPr lang="en-US" sz="1600" dirty="0" smtClean="0">
-                <a:solidFill>
-                  <a:srgbClr val="000000"/>
-                </a:solidFill>
-                <a:latin typeface="Calibri" panose="020F0502020204030204" pitchFamily="34" charset="0"/>
-              </a:rPr>
-              <a:t>(</a:t>
-            </a:r>
-            <a:r>
-              <a:rPr lang="sr-Latn-BA" sz="1600" dirty="0" smtClean="0">
-                <a:solidFill>
-                  <a:srgbClr val="000000"/>
-                </a:solidFill>
-                <a:latin typeface="Calibri" panose="020F0502020204030204" pitchFamily="34" charset="0"/>
-              </a:rPr>
-              <a:t>S</a:t>
-            </a:r>
-            <a:r>
-              <a:rPr lang="en-US" sz="1600" dirty="0" smtClean="0">
-                <a:solidFill>
-                  <a:srgbClr val="000000"/>
-                </a:solidFill>
-                <a:latin typeface="Calibri" panose="020F0502020204030204" pitchFamily="34" charset="0"/>
-              </a:rPr>
-              <a:t>)={</a:t>
-            </a:r>
-            <a:r>
-              <a:rPr lang="en-US" sz="1600" i="1" dirty="0" smtClean="0">
-                <a:solidFill>
-                  <a:srgbClr val="000000"/>
-                </a:solidFill>
-                <a:latin typeface="Calibri" panose="020F0502020204030204" pitchFamily="34" charset="0"/>
-              </a:rPr>
-              <a:t>f(</a:t>
-            </a:r>
-            <a:r>
-              <a:rPr lang="sr-Latn-BA" sz="1600" i="1" dirty="0">
-                <a:solidFill>
-                  <a:srgbClr val="000000"/>
-                </a:solidFill>
-                <a:latin typeface="Calibri" panose="020F0502020204030204" pitchFamily="34" charset="0"/>
-              </a:rPr>
-              <a:t>p</a:t>
-            </a:r>
-            <a:r>
-              <a:rPr lang="en-US" sz="1600" i="1" baseline="-25000" dirty="0">
-                <a:solidFill>
-                  <a:srgbClr val="000000"/>
-                </a:solidFill>
-                <a:latin typeface="Calibri" panose="020F0502020204030204" pitchFamily="34" charset="0"/>
-              </a:rPr>
-              <a:t>1</a:t>
-            </a:r>
-            <a:r>
-              <a:rPr lang="en-US" sz="1600" i="1" dirty="0" smtClean="0">
-                <a:solidFill>
-                  <a:srgbClr val="000000"/>
-                </a:solidFill>
-                <a:latin typeface="Calibri" panose="020F0502020204030204" pitchFamily="34" charset="0"/>
-              </a:rPr>
-              <a:t>),f(</a:t>
-            </a:r>
-            <a:r>
-              <a:rPr lang="sr-Latn-BA" sz="1600" i="1" dirty="0">
-                <a:solidFill>
-                  <a:srgbClr val="000000"/>
-                </a:solidFill>
-                <a:latin typeface="Calibri" panose="020F0502020204030204" pitchFamily="34" charset="0"/>
-              </a:rPr>
-              <a:t>p</a:t>
-            </a:r>
-            <a:r>
-              <a:rPr lang="en-US" sz="1600" i="1" baseline="-25000" dirty="0">
-                <a:solidFill>
-                  <a:srgbClr val="000000"/>
-                </a:solidFill>
-                <a:latin typeface="Calibri" panose="020F0502020204030204" pitchFamily="34" charset="0"/>
-              </a:rPr>
-              <a:t>2</a:t>
-            </a:r>
-            <a:r>
-              <a:rPr lang="en-US" sz="1600" i="1" dirty="0" smtClean="0">
-                <a:solidFill>
-                  <a:srgbClr val="000000"/>
-                </a:solidFill>
-                <a:latin typeface="Calibri" panose="020F0502020204030204" pitchFamily="34" charset="0"/>
-              </a:rPr>
-              <a:t>)</a:t>
-            </a:r>
-            <a:r>
-              <a:rPr lang="en-US" sz="1600" dirty="0" smtClean="0">
-                <a:solidFill>
-                  <a:srgbClr val="000000"/>
-                </a:solidFill>
-                <a:latin typeface="Calibri" panose="020F0502020204030204" pitchFamily="34" charset="0"/>
-              </a:rPr>
-              <a:t>,…,</a:t>
-            </a:r>
-            <a:r>
-              <a:rPr lang="sr-Latn-BA" sz="1600" i="1" dirty="0" smtClean="0">
-                <a:solidFill>
-                  <a:srgbClr val="000000"/>
-                </a:solidFill>
-                <a:latin typeface="Calibri" panose="020F0502020204030204" pitchFamily="34" charset="0"/>
-              </a:rPr>
-              <a:t> </a:t>
-            </a:r>
-            <a:r>
-              <a:rPr lang="sr-Latn-BA" sz="1600" i="1" dirty="0" smtClean="0">
-                <a:solidFill>
-                  <a:srgbClr val="000000"/>
-                </a:solidFill>
-                <a:latin typeface="Calibri" panose="020F0502020204030204" pitchFamily="34" charset="0"/>
-              </a:rPr>
-              <a:t>f(p</a:t>
-            </a:r>
-            <a:r>
-              <a:rPr lang="en-US" sz="1600" i="1" baseline="-25000" dirty="0" smtClean="0">
-                <a:solidFill>
-                  <a:srgbClr val="000000"/>
-                </a:solidFill>
-                <a:latin typeface="Calibri" panose="020F0502020204030204" pitchFamily="34" charset="0"/>
-              </a:rPr>
-              <a:t>N</a:t>
-            </a:r>
-            <a:r>
-              <a:rPr lang="sr-Latn-BA" sz="1600" dirty="0" smtClean="0">
-                <a:solidFill>
-                  <a:srgbClr val="000000"/>
-                </a:solidFill>
-                <a:latin typeface="Calibri" panose="020F0502020204030204" pitchFamily="34" charset="0"/>
-              </a:rPr>
-              <a:t>)</a:t>
-            </a:r>
-            <a:r>
-              <a:rPr lang="en-US" sz="1600" dirty="0" smtClean="0">
-                <a:solidFill>
-                  <a:srgbClr val="000000"/>
-                </a:solidFill>
-                <a:latin typeface="Calibri" panose="020F0502020204030204" pitchFamily="34" charset="0"/>
-              </a:rPr>
-              <a:t>}</a:t>
-            </a:r>
-            <a:endParaRPr lang="en-US" sz="1600" dirty="0">
-              <a:solidFill>
-                <a:srgbClr val="000000"/>
-              </a:solidFill>
-              <a:latin typeface="Calibri" panose="020F0502020204030204" pitchFamily="34" charset="0"/>
-            </a:endParaRPr>
-          </a:p>
-          <a:p>
-            <a:r>
-              <a:rPr lang="en-US" sz="1600" dirty="0">
-                <a:solidFill>
-                  <a:srgbClr val="000000"/>
-                </a:solidFill>
-                <a:latin typeface="Calibri" panose="020F0502020204030204" pitchFamily="34" charset="0"/>
-              </a:rPr>
-              <a:t>where, </a:t>
-            </a:r>
-            <a:r>
-              <a:rPr lang="en-US" sz="1600" i="1" dirty="0">
-                <a:solidFill>
-                  <a:srgbClr val="000000"/>
-                </a:solidFill>
-                <a:latin typeface="Calibri" panose="020F0502020204030204" pitchFamily="34" charset="0"/>
-              </a:rPr>
-              <a:t>f(</a:t>
-            </a:r>
-            <a:r>
-              <a:rPr lang="sr-Latn-BA" sz="1600" i="1" dirty="0" smtClean="0">
-                <a:solidFill>
-                  <a:srgbClr val="000000"/>
-                </a:solidFill>
-                <a:latin typeface="Calibri" panose="020F0502020204030204" pitchFamily="34" charset="0"/>
-              </a:rPr>
-              <a:t>p</a:t>
-            </a:r>
-            <a:r>
-              <a:rPr lang="sr-Latn-BA" sz="1600" i="1" baseline="-25000" dirty="0" smtClean="0">
-                <a:solidFill>
-                  <a:srgbClr val="000000"/>
-                </a:solidFill>
-                <a:latin typeface="Calibri" panose="020F0502020204030204" pitchFamily="34" charset="0"/>
-              </a:rPr>
-              <a:t>j</a:t>
-            </a:r>
-            <a:r>
-              <a:rPr lang="en-US" sz="1600" i="1" dirty="0" smtClean="0">
-                <a:solidFill>
-                  <a:srgbClr val="000000"/>
-                </a:solidFill>
-                <a:latin typeface="Calibri" panose="020F0502020204030204" pitchFamily="34" charset="0"/>
-              </a:rPr>
-              <a:t>)</a:t>
-            </a:r>
-            <a:r>
-              <a:rPr lang="en-US" sz="1600" dirty="0" smtClean="0">
-                <a:solidFill>
-                  <a:srgbClr val="000000"/>
-                </a:solidFill>
-                <a:latin typeface="Calibri" panose="020F0502020204030204" pitchFamily="34" charset="0"/>
-              </a:rPr>
-              <a:t> </a:t>
-            </a:r>
-            <a:r>
-              <a:rPr lang="en-US" sz="1600" dirty="0">
-                <a:solidFill>
-                  <a:srgbClr val="000000"/>
-                </a:solidFill>
-                <a:latin typeface="Calibri" panose="020F0502020204030204" pitchFamily="34" charset="0"/>
-              </a:rPr>
-              <a:t>= 1 if </a:t>
-            </a:r>
-            <a:r>
-              <a:rPr lang="sr-Latn-BA" sz="1600" i="1" dirty="0" smtClean="0">
-                <a:solidFill>
-                  <a:srgbClr val="000000"/>
-                </a:solidFill>
-                <a:latin typeface="Calibri" panose="020F0502020204030204" pitchFamily="34" charset="0"/>
-              </a:rPr>
-              <a:t>p</a:t>
-            </a:r>
-            <a:r>
-              <a:rPr lang="sr-Latn-BA" sz="1600" i="1" baseline="-25000" dirty="0" smtClean="0">
-                <a:solidFill>
-                  <a:srgbClr val="000000"/>
-                </a:solidFill>
-                <a:latin typeface="Calibri" panose="020F0502020204030204" pitchFamily="34" charset="0"/>
-              </a:rPr>
-              <a:t>j</a:t>
-            </a:r>
-            <a:r>
-              <a:rPr lang="en-US" sz="1600" dirty="0" smtClean="0">
-                <a:solidFill>
-                  <a:srgbClr val="000000"/>
-                </a:solidFill>
-                <a:latin typeface="Calibri" panose="020F0502020204030204" pitchFamily="34" charset="0"/>
-              </a:rPr>
-              <a:t> </a:t>
-            </a:r>
-            <a:r>
-              <a:rPr lang="en-US" sz="1600" dirty="0">
-                <a:solidFill>
-                  <a:srgbClr val="000000"/>
-                </a:solidFill>
-                <a:latin typeface="Calibri" panose="020F0502020204030204" pitchFamily="34" charset="0"/>
-              </a:rPr>
-              <a:t>has the property </a:t>
-            </a:r>
-            <a:r>
-              <a:rPr lang="en-US" sz="1600" i="1" dirty="0">
-                <a:solidFill>
-                  <a:srgbClr val="000000"/>
-                </a:solidFill>
-                <a:latin typeface="Calibri" panose="020F0502020204030204" pitchFamily="34" charset="0"/>
-              </a:rPr>
-              <a:t>prop</a:t>
-            </a:r>
-            <a:r>
-              <a:rPr lang="en-US" sz="1600" dirty="0">
-                <a:solidFill>
-                  <a:srgbClr val="000000"/>
-                </a:solidFill>
-                <a:latin typeface="Calibri" panose="020F0502020204030204" pitchFamily="34" charset="0"/>
-              </a:rPr>
-              <a:t>.</a:t>
-            </a:r>
-          </a:p>
-          <a:p>
-            <a:r>
-              <a:rPr lang="en-US" sz="1600" dirty="0">
-                <a:solidFill>
-                  <a:srgbClr val="000000"/>
-                </a:solidFill>
-                <a:latin typeface="Calibri" panose="020F0502020204030204" pitchFamily="34" charset="0"/>
-              </a:rPr>
-              <a:t>Calculate two inter-arrival distances (IADs) array for successive residues i.e. determine the distance between two successive residues: (</a:t>
-            </a:r>
-            <a:r>
-              <a:rPr lang="en-US" sz="1600" i="1" dirty="0">
-                <a:solidFill>
-                  <a:srgbClr val="000000"/>
-                </a:solidFill>
-                <a:latin typeface="Calibri" panose="020F0502020204030204" pitchFamily="34" charset="0"/>
-              </a:rPr>
-              <a:t>array1</a:t>
-            </a:r>
-            <a:r>
-              <a:rPr lang="en-US" sz="1600" dirty="0">
-                <a:solidFill>
-                  <a:srgbClr val="000000"/>
-                </a:solidFill>
-                <a:latin typeface="Calibri" panose="020F0502020204030204" pitchFamily="34" charset="0"/>
-              </a:rPr>
-              <a:t>) </a:t>
-            </a:r>
-            <a:r>
-              <a:rPr lang="en-US" sz="1600" dirty="0" smtClean="0">
-                <a:solidFill>
-                  <a:srgbClr val="000000"/>
-                </a:solidFill>
-                <a:latin typeface="Calibri" panose="020F0502020204030204" pitchFamily="34" charset="0"/>
-              </a:rPr>
-              <a:t>distances between ones, and </a:t>
-            </a:r>
-            <a:r>
-              <a:rPr lang="en-US" sz="1600" dirty="0">
-                <a:solidFill>
-                  <a:srgbClr val="000000"/>
-                </a:solidFill>
-                <a:latin typeface="Calibri" panose="020F0502020204030204" pitchFamily="34" charset="0"/>
-              </a:rPr>
-              <a:t>(</a:t>
-            </a:r>
-            <a:r>
-              <a:rPr lang="en-US" sz="1600" i="1" dirty="0">
-                <a:solidFill>
-                  <a:srgbClr val="000000"/>
-                </a:solidFill>
-                <a:latin typeface="Calibri" panose="020F0502020204030204" pitchFamily="34" charset="0"/>
-              </a:rPr>
-              <a:t>array2</a:t>
-            </a:r>
-            <a:r>
-              <a:rPr lang="en-US" sz="1600" dirty="0">
-                <a:solidFill>
-                  <a:srgbClr val="000000"/>
-                </a:solidFill>
-                <a:latin typeface="Calibri" panose="020F0502020204030204" pitchFamily="34" charset="0"/>
-              </a:rPr>
-              <a:t>) </a:t>
-            </a:r>
-            <a:r>
-              <a:rPr lang="en-US" sz="1600" dirty="0">
-                <a:solidFill>
-                  <a:srgbClr val="000000"/>
-                </a:solidFill>
-                <a:latin typeface="Calibri" panose="020F0502020204030204" pitchFamily="34" charset="0"/>
-              </a:rPr>
-              <a:t>distances between </a:t>
+              <a:t>) distances between </a:t>
             </a:r>
             <a:r>
               <a:rPr lang="en-US" sz="1600" dirty="0" smtClean="0">
@@ -13466,7 +13424,7 @@
           <p:cNvPr id="21" name="Diagram 20">
             <a:extLst>
               <a:ext uri="{FF2B5EF4-FFF2-40B4-BE49-F238E27FC236}">
-                <a16:creationId xmlns:a16="http://schemas.microsoft.com/office/drawing/2014/main" xmlns="" id="{E3B1F8A6-065A-446D-865B-A7233CC9A7C0}"/>
+                <a16:creationId xmlns="" xmlns:a16="http://schemas.microsoft.com/office/drawing/2014/main" id="{E3B1F8A6-065A-446D-865B-A7233CC9A7C0}"/>
               </a:ext>
             </a:extLst>
           </p:cNvPr>
@@ -13494,7 +13452,7 @@
           <p:cNvPr id="59" name="Rectangle 58">
             <a:extLst>
               <a:ext uri="{FF2B5EF4-FFF2-40B4-BE49-F238E27FC236}">
-                <a16:creationId xmlns:a16="http://schemas.microsoft.com/office/drawing/2014/main" xmlns="" id="{632B674B-5C97-4C65-B93A-0721E9DC16EE}"/>
+                <a16:creationId xmlns="" xmlns:a16="http://schemas.microsoft.com/office/drawing/2014/main" id="{632B674B-5C97-4C65-B93A-0721E9DC16EE}"/>
               </a:ext>
             </a:extLst>
           </p:cNvPr>
@@ -13549,7 +13507,7 @@
           <p:cNvPr id="60" name="Rectangle 59">
             <a:extLst>
               <a:ext uri="{FF2B5EF4-FFF2-40B4-BE49-F238E27FC236}">
-                <a16:creationId xmlns:a16="http://schemas.microsoft.com/office/drawing/2014/main" xmlns="" id="{1447920C-522C-48BD-BD46-479D0D73E142}"/>
+                <a16:creationId xmlns="" xmlns:a16="http://schemas.microsoft.com/office/drawing/2014/main" id="{1447920C-522C-48BD-BD46-479D0D73E142}"/>
               </a:ext>
             </a:extLst>
           </p:cNvPr>
@@ -13632,13 +13590,13 @@
           <p:nvPr>
             <p:extLst>
               <p:ext uri="{D42A27DB-BD31-4B8C-83A1-F6EECF244321}">
-                <p14:modId xmlns:p14="http://schemas.microsoft.com/office/powerpoint/2010/main" val="4172961993"/>
+                <p14:modId xmlns:p14="http://schemas.microsoft.com/office/powerpoint/2010/main" val="1832017449"/>
               </p:ext>
             </p:extLst>
           </p:nvPr>
         </p:nvGraphicFramePr>
         <p:xfrm>
-          <a:off x="3707029" y="25596601"/>
+          <a:off x="4715149" y="25740617"/>
           <a:ext cx="20378272" cy="5088208"/>
         </p:xfrm>
         <a:graphic>

</xml_diff>

<commit_message>
ubačena tabela u poster
</commit_message>
<xml_diff>
--- a/poster Solun maj 2024/Solun poster 001.pptx
+++ b/poster Solun maj 2024/Solun poster 001.pptx
@@ -5358,7 +5358,7 @@
           <a:p>
             <a:fld id="{E9776662-CA49-4C96-9773-885CF69B3004}" type="datetimeFigureOut">
               <a:rPr lang="en-US" smtClean="0"/>
-              <a:t>4/10/2024</a:t>
+              <a:t>4/11/2024</a:t>
             </a:fld>
             <a:endParaRPr lang="en-US"/>
           </a:p>
@@ -5891,7 +5891,7 @@
             <a:fld id="{7A200072-612F-4A00-B036-4E419A70927F}" type="datetimeFigureOut">
               <a:rPr lang="sr-Latn-BA" smtClean="0"/>
               <a:pPr/>
-              <a:t>10.4.2024.</a:t>
+              <a:t>11.4.2024.</a:t>
             </a:fld>
             <a:endParaRPr lang="sr-Latn-BA"/>
           </a:p>
@@ -6058,7 +6058,7 @@
             <a:fld id="{7A200072-612F-4A00-B036-4E419A70927F}" type="datetimeFigureOut">
               <a:rPr lang="sr-Latn-BA" smtClean="0"/>
               <a:pPr/>
-              <a:t>10.4.2024.</a:t>
+              <a:t>11.4.2024.</a:t>
             </a:fld>
             <a:endParaRPr lang="sr-Latn-BA"/>
           </a:p>
@@ -6235,7 +6235,7 @@
             <a:fld id="{7A200072-612F-4A00-B036-4E419A70927F}" type="datetimeFigureOut">
               <a:rPr lang="sr-Latn-BA" smtClean="0"/>
               <a:pPr/>
-              <a:t>10.4.2024.</a:t>
+              <a:t>11.4.2024.</a:t>
             </a:fld>
             <a:endParaRPr lang="sr-Latn-BA"/>
           </a:p>
@@ -6402,7 +6402,7 @@
             <a:fld id="{7A200072-612F-4A00-B036-4E419A70927F}" type="datetimeFigureOut">
               <a:rPr lang="sr-Latn-BA" smtClean="0"/>
               <a:pPr/>
-              <a:t>10.4.2024.</a:t>
+              <a:t>11.4.2024.</a:t>
             </a:fld>
             <a:endParaRPr lang="sr-Latn-BA"/>
           </a:p>
@@ -6645,7 +6645,7 @@
             <a:fld id="{7A200072-612F-4A00-B036-4E419A70927F}" type="datetimeFigureOut">
               <a:rPr lang="sr-Latn-BA" smtClean="0"/>
               <a:pPr/>
-              <a:t>10.4.2024.</a:t>
+              <a:t>11.4.2024.</a:t>
             </a:fld>
             <a:endParaRPr lang="sr-Latn-BA"/>
           </a:p>
@@ -6930,7 +6930,7 @@
             <a:fld id="{7A200072-612F-4A00-B036-4E419A70927F}" type="datetimeFigureOut">
               <a:rPr lang="sr-Latn-BA" smtClean="0"/>
               <a:pPr/>
-              <a:t>10.4.2024.</a:t>
+              <a:t>11.4.2024.</a:t>
             </a:fld>
             <a:endParaRPr lang="sr-Latn-BA"/>
           </a:p>
@@ -7354,7 +7354,7 @@
             <a:fld id="{7A200072-612F-4A00-B036-4E419A70927F}" type="datetimeFigureOut">
               <a:rPr lang="sr-Latn-BA" smtClean="0"/>
               <a:pPr/>
-              <a:t>10.4.2024.</a:t>
+              <a:t>11.4.2024.</a:t>
             </a:fld>
             <a:endParaRPr lang="sr-Latn-BA"/>
           </a:p>
@@ -7469,7 +7469,7 @@
             <a:fld id="{7A200072-612F-4A00-B036-4E419A70927F}" type="datetimeFigureOut">
               <a:rPr lang="sr-Latn-BA" smtClean="0"/>
               <a:pPr/>
-              <a:t>10.4.2024.</a:t>
+              <a:t>11.4.2024.</a:t>
             </a:fld>
             <a:endParaRPr lang="sr-Latn-BA"/>
           </a:p>
@@ -7561,7 +7561,7 @@
             <a:fld id="{7A200072-612F-4A00-B036-4E419A70927F}" type="datetimeFigureOut">
               <a:rPr lang="sr-Latn-BA" smtClean="0"/>
               <a:pPr/>
-              <a:t>10.4.2024.</a:t>
+              <a:t>11.4.2024.</a:t>
             </a:fld>
             <a:endParaRPr lang="sr-Latn-BA"/>
           </a:p>
@@ -7835,7 +7835,7 @@
             <a:fld id="{7A200072-612F-4A00-B036-4E419A70927F}" type="datetimeFigureOut">
               <a:rPr lang="sr-Latn-BA" smtClean="0"/>
               <a:pPr/>
-              <a:t>10.4.2024.</a:t>
+              <a:t>11.4.2024.</a:t>
             </a:fld>
             <a:endParaRPr lang="sr-Latn-BA"/>
           </a:p>
@@ -8085,7 +8085,7 @@
             <a:fld id="{7A200072-612F-4A00-B036-4E419A70927F}" type="datetimeFigureOut">
               <a:rPr lang="sr-Latn-BA" smtClean="0"/>
               <a:pPr/>
-              <a:t>10.4.2024.</a:t>
+              <a:t>11.4.2024.</a:t>
             </a:fld>
             <a:endParaRPr lang="sr-Latn-BA"/>
           </a:p>
@@ -8305,7 +8305,7 @@
             <a:fld id="{7A200072-612F-4A00-B036-4E419A70927F}" type="datetimeFigureOut">
               <a:rPr lang="sr-Latn-BA" smtClean="0"/>
               <a:pPr/>
-              <a:t>10.4.2024.</a:t>
+              <a:t>11.4.2024.</a:t>
             </a:fld>
             <a:endParaRPr lang="sr-Latn-BA"/>
           </a:p>
@@ -8681,7 +8681,7 @@
           <p:cNvPr id="28" name="Rounded Rectangle 3">
             <a:extLst>
               <a:ext uri="{FF2B5EF4-FFF2-40B4-BE49-F238E27FC236}">
-                <a16:creationId xmlns:a16="http://schemas.microsoft.com/office/drawing/2014/main" xmlns="" id="{E42E21C6-7A64-4E84-A503-EF9679DF851D}"/>
+                <a16:creationId xmlns="" xmlns:a16="http://schemas.microsoft.com/office/drawing/2014/main" id="{E42E21C6-7A64-4E84-A503-EF9679DF851D}"/>
               </a:ext>
             </a:extLst>
           </p:cNvPr>
@@ -8754,7 +8754,7 @@
           <p:cNvPr id="27" name="Rounded Rectangle 3">
             <a:extLst>
               <a:ext uri="{FF2B5EF4-FFF2-40B4-BE49-F238E27FC236}">
-                <a16:creationId xmlns:a16="http://schemas.microsoft.com/office/drawing/2014/main" xmlns="" id="{1C16C5A3-8C37-4B07-AA5E-BABF5084826F}"/>
+                <a16:creationId xmlns="" xmlns:a16="http://schemas.microsoft.com/office/drawing/2014/main" id="{1C16C5A3-8C37-4B07-AA5E-BABF5084826F}"/>
               </a:ext>
             </a:extLst>
           </p:cNvPr>
@@ -8763,7 +8763,7 @@
         </p:nvSpPr>
         <p:spPr>
           <a:xfrm>
-            <a:off x="442163" y="15953364"/>
+            <a:off x="394669" y="15947529"/>
             <a:ext cx="15578242" cy="7546294"/>
           </a:xfrm>
           <a:prstGeom prst="roundRect">
@@ -10906,7 +10906,7 @@
           <p:cNvPr id="30" name="Rounded Rectangle 47">
             <a:extLst>
               <a:ext uri="{FF2B5EF4-FFF2-40B4-BE49-F238E27FC236}">
-                <a16:creationId xmlns:a16="http://schemas.microsoft.com/office/drawing/2014/main" xmlns="" id="{33946411-5D0B-4586-92C0-9422A01632C7}"/>
+                <a16:creationId xmlns="" xmlns:a16="http://schemas.microsoft.com/office/drawing/2014/main" id="{33946411-5D0B-4586-92C0-9422A01632C7}"/>
               </a:ext>
             </a:extLst>
           </p:cNvPr>
@@ -10963,7 +10963,7 @@
           <p:cNvPr id="31" name="Rounded Rectangle 47">
             <a:extLst>
               <a:ext uri="{FF2B5EF4-FFF2-40B4-BE49-F238E27FC236}">
-                <a16:creationId xmlns:a16="http://schemas.microsoft.com/office/drawing/2014/main" xmlns="" id="{5FB06176-787A-4601-99AD-07335A70D009}"/>
+                <a16:creationId xmlns="" xmlns:a16="http://schemas.microsoft.com/office/drawing/2014/main" id="{5FB06176-787A-4601-99AD-07335A70D009}"/>
               </a:ext>
             </a:extLst>
           </p:cNvPr>
@@ -11020,7 +11020,7 @@
           <p:cNvPr id="14" name="Diagram 13">
             <a:extLst>
               <a:ext uri="{FF2B5EF4-FFF2-40B4-BE49-F238E27FC236}">
-                <a16:creationId xmlns:a16="http://schemas.microsoft.com/office/drawing/2014/main" xmlns="" id="{AA320E81-5855-4B1B-A249-74E4C7FE7477}"/>
+                <a16:creationId xmlns="" xmlns:a16="http://schemas.microsoft.com/office/drawing/2014/main" id="{AA320E81-5855-4B1B-A249-74E4C7FE7477}"/>
               </a:ext>
             </a:extLst>
           </p:cNvPr>
@@ -11048,7 +11048,7 @@
           <p:cNvPr id="1026" name="Picture 2" descr="https://assets-global.website-files.com/621e95f9ac30687a56e4297e/64a8d750505cf8e707066669_V2_1676215759712_7b2330a6-df89-49b4-be67-3b44bfb50040.png">
             <a:extLst>
               <a:ext uri="{FF2B5EF4-FFF2-40B4-BE49-F238E27FC236}">
-                <a16:creationId xmlns:a16="http://schemas.microsoft.com/office/drawing/2014/main" xmlns="" id="{EBEBC945-E341-4136-8DC8-448F42B87F70}"/>
+                <a16:creationId xmlns="" xmlns:a16="http://schemas.microsoft.com/office/drawing/2014/main" id="{EBEBC945-E341-4136-8DC8-448F42B87F70}"/>
               </a:ext>
             </a:extLst>
           </p:cNvPr>
@@ -11070,7 +11070,7 @@
         </p:blipFill>
         <p:spPr bwMode="auto">
           <a:xfrm>
-            <a:off x="776033" y="16752672"/>
+            <a:off x="682701" y="16667609"/>
             <a:ext cx="3456385" cy="2503869"/>
           </a:xfrm>
           <a:prstGeom prst="rect">
@@ -11093,7 +11093,7 @@
           <p:cNvPr id="44" name="Picture 2" descr="https://assets-global.website-files.com/621e95f9ac30687a56e4297e/64a8d750505cf8e707066669_V2_1676215759712_7b2330a6-df89-49b4-be67-3b44bfb50040.png">
             <a:extLst>
               <a:ext uri="{FF2B5EF4-FFF2-40B4-BE49-F238E27FC236}">
-                <a16:creationId xmlns:a16="http://schemas.microsoft.com/office/drawing/2014/main" xmlns="" id="{34F3213A-A300-4253-B3DE-16FD671B4B9E}"/>
+                <a16:creationId xmlns="" xmlns:a16="http://schemas.microsoft.com/office/drawing/2014/main" id="{34F3213A-A300-4253-B3DE-16FD671B4B9E}"/>
               </a:ext>
             </a:extLst>
           </p:cNvPr>
@@ -11115,7 +11115,7 @@
         </p:blipFill>
         <p:spPr bwMode="auto">
           <a:xfrm>
-            <a:off x="4571133" y="16739617"/>
+            <a:off x="5020273" y="16667609"/>
             <a:ext cx="3456385" cy="2503869"/>
           </a:xfrm>
           <a:prstGeom prst="rect">
@@ -11138,7 +11138,7 @@
           <p:cNvPr id="18" name="Rectangle 17">
             <a:extLst>
               <a:ext uri="{FF2B5EF4-FFF2-40B4-BE49-F238E27FC236}">
-                <a16:creationId xmlns:a16="http://schemas.microsoft.com/office/drawing/2014/main" xmlns="" id="{15C5418E-2EC7-4CDD-A50D-4A1976FD60F2}"/>
+                <a16:creationId xmlns="" xmlns:a16="http://schemas.microsoft.com/office/drawing/2014/main" id="{15C5418E-2EC7-4CDD-A50D-4A1976FD60F2}"/>
               </a:ext>
             </a:extLst>
           </p:cNvPr>
@@ -11296,7 +11296,7 @@
           <p:cNvPr id="49" name="Rectangle 48">
             <a:extLst>
               <a:ext uri="{FF2B5EF4-FFF2-40B4-BE49-F238E27FC236}">
-                <a16:creationId xmlns:a16="http://schemas.microsoft.com/office/drawing/2014/main" xmlns="" id="{7FA12D37-8BE6-48FA-A3E0-7F6D80828A2A}"/>
+                <a16:creationId xmlns="" xmlns:a16="http://schemas.microsoft.com/office/drawing/2014/main" id="{7FA12D37-8BE6-48FA-A3E0-7F6D80828A2A}"/>
               </a:ext>
             </a:extLst>
           </p:cNvPr>
@@ -11682,7 +11682,7 @@
           <p:cNvPr id="50" name="Rectangle 49">
             <a:extLst>
               <a:ext uri="{FF2B5EF4-FFF2-40B4-BE49-F238E27FC236}">
-                <a16:creationId xmlns:a16="http://schemas.microsoft.com/office/drawing/2014/main" xmlns="" id="{8E1A2B0C-839C-4318-ACA5-56B88B30D089}"/>
+                <a16:creationId xmlns="" xmlns:a16="http://schemas.microsoft.com/office/drawing/2014/main" id="{8E1A2B0C-839C-4318-ACA5-56B88B30D089}"/>
               </a:ext>
             </a:extLst>
           </p:cNvPr>
@@ -11857,7 +11857,7 @@
           <p:cNvPr id="52" name="Rounded Rectangle 47">
             <a:extLst>
               <a:ext uri="{FF2B5EF4-FFF2-40B4-BE49-F238E27FC236}">
-                <a16:creationId xmlns:a16="http://schemas.microsoft.com/office/drawing/2014/main" xmlns="" id="{82BE85DE-FD18-4E3E-BE20-52E122985005}"/>
+                <a16:creationId xmlns="" xmlns:a16="http://schemas.microsoft.com/office/drawing/2014/main" id="{82BE85DE-FD18-4E3E-BE20-52E122985005}"/>
               </a:ext>
             </a:extLst>
           </p:cNvPr>
@@ -11914,7 +11914,7 @@
           <p:cNvPr id="20" name="Arrow: Right 19">
             <a:extLst>
               <a:ext uri="{FF2B5EF4-FFF2-40B4-BE49-F238E27FC236}">
-                <a16:creationId xmlns:a16="http://schemas.microsoft.com/office/drawing/2014/main" xmlns="" id="{F75BF84B-2C0D-4C09-BA31-AFAAC77EAF11}"/>
+                <a16:creationId xmlns="" xmlns:a16="http://schemas.microsoft.com/office/drawing/2014/main" id="{F75BF84B-2C0D-4C09-BA31-AFAAC77EAF11}"/>
               </a:ext>
             </a:extLst>
           </p:cNvPr>
@@ -11923,7 +11923,7 @@
         </p:nvSpPr>
         <p:spPr>
           <a:xfrm>
-            <a:off x="8106792" y="17120866"/>
+            <a:off x="8531573" y="17027649"/>
             <a:ext cx="1053527" cy="748945"/>
           </a:xfrm>
           <a:prstGeom prst="rightArrow">
@@ -11960,7 +11960,7 @@
           <p:cNvPr id="55" name="Arrow: Right 54">
             <a:extLst>
               <a:ext uri="{FF2B5EF4-FFF2-40B4-BE49-F238E27FC236}">
-                <a16:creationId xmlns:a16="http://schemas.microsoft.com/office/drawing/2014/main" xmlns="" id="{9FFA1951-3CD1-43F1-812E-2361512B994A}"/>
+                <a16:creationId xmlns="" xmlns:a16="http://schemas.microsoft.com/office/drawing/2014/main" id="{9FFA1951-3CD1-43F1-812E-2361512B994A}"/>
               </a:ext>
             </a:extLst>
           </p:cNvPr>
@@ -12006,7 +12006,7 @@
           <p:cNvPr id="56" name="Rectangle 55">
             <a:extLst>
               <a:ext uri="{FF2B5EF4-FFF2-40B4-BE49-F238E27FC236}">
-                <a16:creationId xmlns:a16="http://schemas.microsoft.com/office/drawing/2014/main" xmlns="" id="{54B82BF6-7CC1-4CC0-A076-02DDFFB69BDA}"/>
+                <a16:creationId xmlns="" xmlns:a16="http://schemas.microsoft.com/office/drawing/2014/main" id="{54B82BF6-7CC1-4CC0-A076-02DDFFB69BDA}"/>
               </a:ext>
             </a:extLst>
           </p:cNvPr>
@@ -12367,7 +12367,7 @@
           <p:cNvPr id="57" name="Rounded Rectangle 47">
             <a:extLst>
               <a:ext uri="{FF2B5EF4-FFF2-40B4-BE49-F238E27FC236}">
-                <a16:creationId xmlns:a16="http://schemas.microsoft.com/office/drawing/2014/main" xmlns="" id="{094D318D-7740-40B1-8FDC-752A452D00FC}"/>
+                <a16:creationId xmlns="" xmlns:a16="http://schemas.microsoft.com/office/drawing/2014/main" id="{094D318D-7740-40B1-8FDC-752A452D00FC}"/>
               </a:ext>
             </a:extLst>
           </p:cNvPr>
@@ -12424,7 +12424,7 @@
           <p:cNvPr id="58" name="Rectangle 57">
             <a:extLst>
               <a:ext uri="{FF2B5EF4-FFF2-40B4-BE49-F238E27FC236}">
-                <a16:creationId xmlns:a16="http://schemas.microsoft.com/office/drawing/2014/main" xmlns="" id="{E5A2346C-B437-4A8F-8C2E-BBED9297E0C1}"/>
+                <a16:creationId xmlns="" xmlns:a16="http://schemas.microsoft.com/office/drawing/2014/main" id="{E5A2346C-B437-4A8F-8C2E-BBED9297E0C1}"/>
               </a:ext>
             </a:extLst>
           </p:cNvPr>
@@ -13424,7 +13424,7 @@
           <p:cNvPr id="21" name="Diagram 20">
             <a:extLst>
               <a:ext uri="{FF2B5EF4-FFF2-40B4-BE49-F238E27FC236}">
-                <a16:creationId xmlns:a16="http://schemas.microsoft.com/office/drawing/2014/main" xmlns="" id="{E3B1F8A6-065A-446D-865B-A7233CC9A7C0}"/>
+                <a16:creationId xmlns="" xmlns:a16="http://schemas.microsoft.com/office/drawing/2014/main" id="{E3B1F8A6-065A-446D-865B-A7233CC9A7C0}"/>
               </a:ext>
             </a:extLst>
           </p:cNvPr>
@@ -13452,7 +13452,7 @@
           <p:cNvPr id="59" name="Rectangle 58">
             <a:extLst>
               <a:ext uri="{FF2B5EF4-FFF2-40B4-BE49-F238E27FC236}">
-                <a16:creationId xmlns:a16="http://schemas.microsoft.com/office/drawing/2014/main" xmlns="" id="{632B674B-5C97-4C65-B93A-0721E9DC16EE}"/>
+                <a16:creationId xmlns="" xmlns:a16="http://schemas.microsoft.com/office/drawing/2014/main" id="{632B674B-5C97-4C65-B93A-0721E9DC16EE}"/>
               </a:ext>
             </a:extLst>
           </p:cNvPr>
@@ -13507,7 +13507,7 @@
           <p:cNvPr id="60" name="Rectangle 59">
             <a:extLst>
               <a:ext uri="{FF2B5EF4-FFF2-40B4-BE49-F238E27FC236}">
-                <a16:creationId xmlns:a16="http://schemas.microsoft.com/office/drawing/2014/main" xmlns="" id="{1447920C-522C-48BD-BD46-479D0D73E142}"/>
+                <a16:creationId xmlns="" xmlns:a16="http://schemas.microsoft.com/office/drawing/2014/main" id="{1447920C-522C-48BD-BD46-479D0D73E142}"/>
               </a:ext>
             </a:extLst>
           </p:cNvPr>
@@ -13590,7 +13590,7 @@
           <p:nvPr>
             <p:extLst>
               <p:ext uri="{D42A27DB-BD31-4B8C-83A1-F6EECF244321}">
-                <p14:modId xmlns:p14="http://schemas.microsoft.com/office/powerpoint/2010/main" val="1832017449"/>
+                <p14:modId xmlns:p14="http://schemas.microsoft.com/office/powerpoint/2010/main" val="957424099"/>
               </p:ext>
             </p:extLst>
           </p:nvPr>
@@ -13930,13 +13930,31 @@
                   </a:txBody>
                   <a:tcPr/>
                 </a:tc>
-                <a:tc gridSpan="2">
+                <a:tc>
                   <a:txBody>
                     <a:bodyPr/>
                     <a:lstStyle/>
                     <a:p>
-                      <a:pPr algn="ctr"/>
-                      <a:endParaRPr lang="en-US" sz="3000" dirty="0"/>
+                      <a:pPr marL="0" marR="0" algn="ctr">
+                        <a:lnSpc>
+                          <a:spcPct val="107000"/>
+                        </a:lnSpc>
+                        <a:spcBef>
+                          <a:spcPts val="0"/>
+                        </a:spcBef>
+                        <a:spcAft>
+                          <a:spcPts val="800"/>
+                        </a:spcAft>
+                      </a:pPr>
+                      <a:r>
+                        <a:rPr lang="en-US" sz="2800">
+                          <a:effectLst/>
+                          <a:latin typeface="Calibri" panose="020F0502020204030204" pitchFamily="34" charset="0"/>
+                          <a:ea typeface="Calibri" panose="020F0502020204030204" pitchFamily="34" charset="0"/>
+                          <a:cs typeface="Times New Roman" panose="02020603050405020304" pitchFamily="18" charset="0"/>
+                        </a:rPr>
+                        <a:t>0.93</a:t>
+                      </a:r>
                     </a:p>
                   </a:txBody>
                   <a:tcPr anchor="ctr">
@@ -13960,23 +13978,60 @@
                     </a:lnR>
                   </a:tcPr>
                 </a:tc>
-                <a:tc hMerge="1">
+                <a:tc>
                   <a:txBody>
                     <a:bodyPr/>
                     <a:lstStyle/>
                     <a:p>
-                      <a:endParaRPr lang="en-US"/>
+                      <a:pPr marL="0" marR="0" algn="ctr">
+                        <a:lnSpc>
+                          <a:spcPct val="107000"/>
+                        </a:lnSpc>
+                        <a:spcBef>
+                          <a:spcPts val="0"/>
+                        </a:spcBef>
+                        <a:spcAft>
+                          <a:spcPts val="800"/>
+                        </a:spcAft>
+                      </a:pPr>
+                      <a:r>
+                        <a:rPr lang="en-US" sz="2800">
+                          <a:effectLst/>
+                          <a:latin typeface="Calibri" panose="020F0502020204030204" pitchFamily="34" charset="0"/>
+                          <a:ea typeface="Calibri" panose="020F0502020204030204" pitchFamily="34" charset="0"/>
+                          <a:cs typeface="Times New Roman" panose="02020603050405020304" pitchFamily="18" charset="0"/>
+                        </a:rPr>
+                        <a:t>0.91</a:t>
+                      </a:r>
                     </a:p>
                   </a:txBody>
-                  <a:tcPr/>
+                  <a:tcPr anchor="ctr"/>
                 </a:tc>
-                <a:tc gridSpan="2">
+                <a:tc>
                   <a:txBody>
                     <a:bodyPr/>
                     <a:lstStyle/>
                     <a:p>
-                      <a:pPr algn="ctr"/>
-                      <a:endParaRPr lang="en-US" sz="3000" dirty="0"/>
+                      <a:pPr marL="0" marR="0" algn="ctr">
+                        <a:lnSpc>
+                          <a:spcPct val="107000"/>
+                        </a:lnSpc>
+                        <a:spcBef>
+                          <a:spcPts val="0"/>
+                        </a:spcBef>
+                        <a:spcAft>
+                          <a:spcPts val="800"/>
+                        </a:spcAft>
+                      </a:pPr>
+                      <a:r>
+                        <a:rPr lang="en-US" sz="2800">
+                          <a:effectLst/>
+                          <a:latin typeface="Calibri" panose="020F0502020204030204" pitchFamily="34" charset="0"/>
+                          <a:ea typeface="Calibri" panose="020F0502020204030204" pitchFamily="34" charset="0"/>
+                          <a:cs typeface="Times New Roman" panose="02020603050405020304" pitchFamily="18" charset="0"/>
+                        </a:rPr>
+                        <a:t>0.92</a:t>
+                      </a:r>
                     </a:p>
                   </a:txBody>
                   <a:tcPr anchor="ctr">
@@ -14000,23 +14055,60 @@
                     </a:lnR>
                   </a:tcPr>
                 </a:tc>
-                <a:tc hMerge="1">
+                <a:tc>
                   <a:txBody>
                     <a:bodyPr/>
                     <a:lstStyle/>
                     <a:p>
-                      <a:endParaRPr lang="en-US"/>
+                      <a:pPr marL="0" marR="0" algn="ctr">
+                        <a:lnSpc>
+                          <a:spcPct val="107000"/>
+                        </a:lnSpc>
+                        <a:spcBef>
+                          <a:spcPts val="0"/>
+                        </a:spcBef>
+                        <a:spcAft>
+                          <a:spcPts val="800"/>
+                        </a:spcAft>
+                      </a:pPr>
+                      <a:r>
+                        <a:rPr lang="en-US" sz="2800">
+                          <a:effectLst/>
+                          <a:latin typeface="Calibri" panose="020F0502020204030204" pitchFamily="34" charset="0"/>
+                          <a:ea typeface="Calibri" panose="020F0502020204030204" pitchFamily="34" charset="0"/>
+                          <a:cs typeface="Times New Roman" panose="02020603050405020304" pitchFamily="18" charset="0"/>
+                        </a:rPr>
+                        <a:t>0.90</a:t>
+                      </a:r>
                     </a:p>
                   </a:txBody>
-                  <a:tcPr/>
+                  <a:tcPr anchor="ctr"/>
                 </a:tc>
-                <a:tc gridSpan="2">
+                <a:tc>
                   <a:txBody>
                     <a:bodyPr/>
                     <a:lstStyle/>
                     <a:p>
-                      <a:pPr algn="ctr"/>
-                      <a:endParaRPr lang="en-US" sz="3000" dirty="0"/>
+                      <a:pPr marL="0" marR="0" algn="ctr">
+                        <a:lnSpc>
+                          <a:spcPct val="107000"/>
+                        </a:lnSpc>
+                        <a:spcBef>
+                          <a:spcPts val="0"/>
+                        </a:spcBef>
+                        <a:spcAft>
+                          <a:spcPts val="800"/>
+                        </a:spcAft>
+                      </a:pPr>
+                      <a:r>
+                        <a:rPr lang="en-US" sz="2800">
+                          <a:effectLst/>
+                          <a:latin typeface="Calibri" panose="020F0502020204030204" pitchFamily="34" charset="0"/>
+                          <a:ea typeface="Calibri" panose="020F0502020204030204" pitchFamily="34" charset="0"/>
+                          <a:cs typeface="Times New Roman" panose="02020603050405020304" pitchFamily="18" charset="0"/>
+                        </a:rPr>
+                        <a:t>0.93</a:t>
+                      </a:r>
                     </a:p>
                   </a:txBody>
                   <a:tcPr anchor="ctr">
@@ -14040,23 +14132,60 @@
                     </a:lnR>
                   </a:tcPr>
                 </a:tc>
-                <a:tc hMerge="1">
+                <a:tc>
                   <a:txBody>
                     <a:bodyPr/>
                     <a:lstStyle/>
                     <a:p>
-                      <a:endParaRPr lang="en-US"/>
+                      <a:pPr marL="0" marR="0" algn="ctr">
+                        <a:lnSpc>
+                          <a:spcPct val="107000"/>
+                        </a:lnSpc>
+                        <a:spcBef>
+                          <a:spcPts val="0"/>
+                        </a:spcBef>
+                        <a:spcAft>
+                          <a:spcPts val="800"/>
+                        </a:spcAft>
+                      </a:pPr>
+                      <a:r>
+                        <a:rPr lang="en-US" sz="2800">
+                          <a:effectLst/>
+                          <a:latin typeface="Calibri" panose="020F0502020204030204" pitchFamily="34" charset="0"/>
+                          <a:ea typeface="Calibri" panose="020F0502020204030204" pitchFamily="34" charset="0"/>
+                          <a:cs typeface="Times New Roman" panose="02020603050405020304" pitchFamily="18" charset="0"/>
+                        </a:rPr>
+                        <a:t>0.91</a:t>
+                      </a:r>
                     </a:p>
                   </a:txBody>
-                  <a:tcPr/>
+                  <a:tcPr anchor="ctr"/>
                 </a:tc>
-                <a:tc gridSpan="2">
+                <a:tc>
                   <a:txBody>
                     <a:bodyPr/>
                     <a:lstStyle/>
                     <a:p>
-                      <a:pPr algn="ctr"/>
-                      <a:endParaRPr lang="en-US" sz="3000"/>
+                      <a:pPr marL="0" marR="0" algn="ctr">
+                        <a:lnSpc>
+                          <a:spcPct val="107000"/>
+                        </a:lnSpc>
+                        <a:spcBef>
+                          <a:spcPts val="0"/>
+                        </a:spcBef>
+                        <a:spcAft>
+                          <a:spcPts val="800"/>
+                        </a:spcAft>
+                      </a:pPr>
+                      <a:r>
+                        <a:rPr lang="en-US" sz="2800">
+                          <a:effectLst/>
+                          <a:latin typeface="Calibri" panose="020F0502020204030204" pitchFamily="34" charset="0"/>
+                          <a:ea typeface="Calibri" panose="020F0502020204030204" pitchFamily="34" charset="0"/>
+                          <a:cs typeface="Times New Roman" panose="02020603050405020304" pitchFamily="18" charset="0"/>
+                        </a:rPr>
+                        <a:t>0.92</a:t>
+                      </a:r>
                     </a:p>
                   </a:txBody>
                   <a:tcPr anchor="ctr">
@@ -14071,15 +14200,34 @@
                     </a:lnL>
                   </a:tcPr>
                 </a:tc>
-                <a:tc hMerge="1">
+                <a:tc>
                   <a:txBody>
                     <a:bodyPr/>
                     <a:lstStyle/>
                     <a:p>
-                      <a:endParaRPr lang="en-US"/>
+                      <a:pPr marL="0" marR="0" algn="ctr">
+                        <a:lnSpc>
+                          <a:spcPct val="107000"/>
+                        </a:lnSpc>
+                        <a:spcBef>
+                          <a:spcPts val="0"/>
+                        </a:spcBef>
+                        <a:spcAft>
+                          <a:spcPts val="800"/>
+                        </a:spcAft>
+                      </a:pPr>
+                      <a:r>
+                        <a:rPr lang="en-US" sz="2800">
+                          <a:effectLst/>
+                          <a:latin typeface="Calibri" panose="020F0502020204030204" pitchFamily="34" charset="0"/>
+                          <a:ea typeface="Calibri" panose="020F0502020204030204" pitchFamily="34" charset="0"/>
+                          <a:cs typeface="Times New Roman" panose="02020603050405020304" pitchFamily="18" charset="0"/>
+                        </a:rPr>
+                        <a:t>0.90</a:t>
+                      </a:r>
                     </a:p>
                   </a:txBody>
-                  <a:tcPr/>
+                  <a:tcPr anchor="ctr"/>
                 </a:tc>
               </a:tr>
               <a:tr h="839734">
@@ -14138,13 +14286,31 @@
                   </a:txBody>
                   <a:tcPr/>
                 </a:tc>
-                <a:tc gridSpan="2">
+                <a:tc>
                   <a:txBody>
                     <a:bodyPr/>
                     <a:lstStyle/>
                     <a:p>
-                      <a:pPr algn="ctr"/>
-                      <a:endParaRPr lang="en-US" sz="3000" dirty="0"/>
+                      <a:pPr marL="0" marR="0" algn="ctr">
+                        <a:lnSpc>
+                          <a:spcPct val="107000"/>
+                        </a:lnSpc>
+                        <a:spcBef>
+                          <a:spcPts val="0"/>
+                        </a:spcBef>
+                        <a:spcAft>
+                          <a:spcPts val="800"/>
+                        </a:spcAft>
+                      </a:pPr>
+                      <a:r>
+                        <a:rPr lang="en-US" sz="2800" dirty="0">
+                          <a:effectLst/>
+                          <a:latin typeface="Calibri" panose="020F0502020204030204" pitchFamily="34" charset="0"/>
+                          <a:ea typeface="Calibri" panose="020F0502020204030204" pitchFamily="34" charset="0"/>
+                          <a:cs typeface="Times New Roman" panose="02020603050405020304" pitchFamily="18" charset="0"/>
+                        </a:rPr>
+                        <a:t>0.20</a:t>
+                      </a:r>
                     </a:p>
                   </a:txBody>
                   <a:tcPr anchor="ctr">
@@ -14168,23 +14334,60 @@
                     </a:lnR>
                   </a:tcPr>
                 </a:tc>
-                <a:tc hMerge="1">
+                <a:tc>
                   <a:txBody>
                     <a:bodyPr/>
                     <a:lstStyle/>
                     <a:p>
-                      <a:endParaRPr lang="en-US"/>
+                      <a:pPr marL="0" marR="0" algn="ctr">
+                        <a:lnSpc>
+                          <a:spcPct val="107000"/>
+                        </a:lnSpc>
+                        <a:spcBef>
+                          <a:spcPts val="0"/>
+                        </a:spcBef>
+                        <a:spcAft>
+                          <a:spcPts val="800"/>
+                        </a:spcAft>
+                      </a:pPr>
+                      <a:r>
+                        <a:rPr lang="en-US" sz="2800">
+                          <a:effectLst/>
+                          <a:latin typeface="Calibri" panose="020F0502020204030204" pitchFamily="34" charset="0"/>
+                          <a:ea typeface="Calibri" panose="020F0502020204030204" pitchFamily="34" charset="0"/>
+                          <a:cs typeface="Times New Roman" panose="02020603050405020304" pitchFamily="18" charset="0"/>
+                        </a:rPr>
+                        <a:t>0.18</a:t>
+                      </a:r>
                     </a:p>
                   </a:txBody>
-                  <a:tcPr/>
+                  <a:tcPr anchor="ctr"/>
                 </a:tc>
-                <a:tc gridSpan="2">
+                <a:tc>
                   <a:txBody>
                     <a:bodyPr/>
                     <a:lstStyle/>
                     <a:p>
-                      <a:pPr algn="ctr"/>
-                      <a:endParaRPr lang="en-US" sz="3000"/>
+                      <a:pPr marL="0" marR="0" algn="ctr">
+                        <a:lnSpc>
+                          <a:spcPct val="107000"/>
+                        </a:lnSpc>
+                        <a:spcBef>
+                          <a:spcPts val="0"/>
+                        </a:spcBef>
+                        <a:spcAft>
+                          <a:spcPts val="800"/>
+                        </a:spcAft>
+                      </a:pPr>
+                      <a:r>
+                        <a:rPr lang="en-US" sz="2800">
+                          <a:effectLst/>
+                          <a:latin typeface="Calibri" panose="020F0502020204030204" pitchFamily="34" charset="0"/>
+                          <a:ea typeface="Calibri" panose="020F0502020204030204" pitchFamily="34" charset="0"/>
+                          <a:cs typeface="Times New Roman" panose="02020603050405020304" pitchFamily="18" charset="0"/>
+                        </a:rPr>
+                        <a:t>0.19</a:t>
+                      </a:r>
                     </a:p>
                   </a:txBody>
                   <a:tcPr anchor="ctr">
@@ -14208,23 +14411,60 @@
                     </a:lnR>
                   </a:tcPr>
                 </a:tc>
-                <a:tc hMerge="1">
+                <a:tc>
                   <a:txBody>
                     <a:bodyPr/>
                     <a:lstStyle/>
                     <a:p>
-                      <a:endParaRPr lang="en-US"/>
+                      <a:pPr marL="0" marR="0" algn="ctr">
+                        <a:lnSpc>
+                          <a:spcPct val="107000"/>
+                        </a:lnSpc>
+                        <a:spcBef>
+                          <a:spcPts val="0"/>
+                        </a:spcBef>
+                        <a:spcAft>
+                          <a:spcPts val="800"/>
+                        </a:spcAft>
+                      </a:pPr>
+                      <a:r>
+                        <a:rPr lang="en-US" sz="2800">
+                          <a:effectLst/>
+                          <a:latin typeface="Calibri" panose="020F0502020204030204" pitchFamily="34" charset="0"/>
+                          <a:ea typeface="Calibri" panose="020F0502020204030204" pitchFamily="34" charset="0"/>
+                          <a:cs typeface="Times New Roman" panose="02020603050405020304" pitchFamily="18" charset="0"/>
+                        </a:rPr>
+                        <a:t>0.19</a:t>
+                      </a:r>
                     </a:p>
                   </a:txBody>
-                  <a:tcPr/>
+                  <a:tcPr anchor="ctr"/>
                 </a:tc>
-                <a:tc gridSpan="2">
+                <a:tc>
                   <a:txBody>
                     <a:bodyPr/>
                     <a:lstStyle/>
                     <a:p>
-                      <a:pPr algn="ctr"/>
-                      <a:endParaRPr lang="en-US" sz="3000" dirty="0"/>
+                      <a:pPr marL="0" marR="0" algn="ctr">
+                        <a:lnSpc>
+                          <a:spcPct val="107000"/>
+                        </a:lnSpc>
+                        <a:spcBef>
+                          <a:spcPts val="0"/>
+                        </a:spcBef>
+                        <a:spcAft>
+                          <a:spcPts val="800"/>
+                        </a:spcAft>
+                      </a:pPr>
+                      <a:r>
+                        <a:rPr lang="en-US" sz="2800">
+                          <a:effectLst/>
+                          <a:latin typeface="Calibri" panose="020F0502020204030204" pitchFamily="34" charset="0"/>
+                          <a:ea typeface="Calibri" panose="020F0502020204030204" pitchFamily="34" charset="0"/>
+                          <a:cs typeface="Times New Roman" panose="02020603050405020304" pitchFamily="18" charset="0"/>
+                        </a:rPr>
+                        <a:t>0.20</a:t>
+                      </a:r>
                     </a:p>
                   </a:txBody>
                   <a:tcPr anchor="ctr">
@@ -14248,23 +14488,60 @@
                     </a:lnR>
                   </a:tcPr>
                 </a:tc>
-                <a:tc hMerge="1">
+                <a:tc>
                   <a:txBody>
                     <a:bodyPr/>
                     <a:lstStyle/>
                     <a:p>
-                      <a:endParaRPr lang="en-US"/>
+                      <a:pPr marL="0" marR="0" algn="ctr">
+                        <a:lnSpc>
+                          <a:spcPct val="107000"/>
+                        </a:lnSpc>
+                        <a:spcBef>
+                          <a:spcPts val="0"/>
+                        </a:spcBef>
+                        <a:spcAft>
+                          <a:spcPts val="800"/>
+                        </a:spcAft>
+                      </a:pPr>
+                      <a:r>
+                        <a:rPr lang="en-US" sz="2800">
+                          <a:effectLst/>
+                          <a:latin typeface="Calibri" panose="020F0502020204030204" pitchFamily="34" charset="0"/>
+                          <a:ea typeface="Calibri" panose="020F0502020204030204" pitchFamily="34" charset="0"/>
+                          <a:cs typeface="Times New Roman" panose="02020603050405020304" pitchFamily="18" charset="0"/>
+                        </a:rPr>
+                        <a:t>0.18</a:t>
+                      </a:r>
                     </a:p>
                   </a:txBody>
-                  <a:tcPr/>
+                  <a:tcPr anchor="ctr"/>
                 </a:tc>
-                <a:tc gridSpan="2">
+                <a:tc>
                   <a:txBody>
                     <a:bodyPr/>
                     <a:lstStyle/>
                     <a:p>
-                      <a:pPr algn="ctr"/>
-                      <a:endParaRPr lang="en-US" sz="3000" dirty="0"/>
+                      <a:pPr marL="0" marR="0" algn="ctr">
+                        <a:lnSpc>
+                          <a:spcPct val="107000"/>
+                        </a:lnSpc>
+                        <a:spcBef>
+                          <a:spcPts val="0"/>
+                        </a:spcBef>
+                        <a:spcAft>
+                          <a:spcPts val="800"/>
+                        </a:spcAft>
+                      </a:pPr>
+                      <a:r>
+                        <a:rPr lang="en-US" sz="2800" dirty="0">
+                          <a:effectLst/>
+                          <a:latin typeface="Calibri" panose="020F0502020204030204" pitchFamily="34" charset="0"/>
+                          <a:ea typeface="Calibri" panose="020F0502020204030204" pitchFamily="34" charset="0"/>
+                          <a:cs typeface="Times New Roman" panose="02020603050405020304" pitchFamily="18" charset="0"/>
+                        </a:rPr>
+                        <a:t>0.19</a:t>
+                      </a:r>
                     </a:p>
                   </a:txBody>
                   <a:tcPr anchor="ctr">
@@ -14279,15 +14556,34 @@
                     </a:lnL>
                   </a:tcPr>
                 </a:tc>
-                <a:tc hMerge="1">
+                <a:tc>
                   <a:txBody>
                     <a:bodyPr/>
                     <a:lstStyle/>
                     <a:p>
-                      <a:endParaRPr lang="en-US"/>
+                      <a:pPr marL="0" marR="0" algn="ctr">
+                        <a:lnSpc>
+                          <a:spcPct val="107000"/>
+                        </a:lnSpc>
+                        <a:spcBef>
+                          <a:spcPts val="0"/>
+                        </a:spcBef>
+                        <a:spcAft>
+                          <a:spcPts val="800"/>
+                        </a:spcAft>
+                      </a:pPr>
+                      <a:r>
+                        <a:rPr lang="en-US" sz="2800" dirty="0">
+                          <a:effectLst/>
+                          <a:latin typeface="Calibri" panose="020F0502020204030204" pitchFamily="34" charset="0"/>
+                          <a:ea typeface="Calibri" panose="020F0502020204030204" pitchFamily="34" charset="0"/>
+                          <a:cs typeface="Times New Roman" panose="02020603050405020304" pitchFamily="18" charset="0"/>
+                        </a:rPr>
+                        <a:t>0.19</a:t>
+                      </a:r>
                     </a:p>
                   </a:txBody>
-                  <a:tcPr/>
+                  <a:tcPr anchor="ctr"/>
                 </a:tc>
               </a:tr>
               <a:tr h="839734">
@@ -14593,8 +14889,26 @@
                     <a:bodyPr/>
                     <a:lstStyle/>
                     <a:p>
-                      <a:pPr algn="ctr"/>
-                      <a:endParaRPr lang="en-US" sz="3000" dirty="0"/>
+                      <a:pPr marL="0" marR="0" algn="ctr">
+                        <a:lnSpc>
+                          <a:spcPct val="107000"/>
+                        </a:lnSpc>
+                        <a:spcBef>
+                          <a:spcPts val="0"/>
+                        </a:spcBef>
+                        <a:spcAft>
+                          <a:spcPts val="800"/>
+                        </a:spcAft>
+                      </a:pPr>
+                      <a:r>
+                        <a:rPr lang="en-US" sz="2800">
+                          <a:effectLst/>
+                          <a:latin typeface="Calibri" panose="020F0502020204030204" pitchFamily="34" charset="0"/>
+                          <a:ea typeface="Calibri" panose="020F0502020204030204" pitchFamily="34" charset="0"/>
+                          <a:cs typeface="Times New Roman" panose="02020603050405020304" pitchFamily="18" charset="0"/>
+                        </a:rPr>
+                        <a:t>1414</a:t>
+                      </a:r>
                     </a:p>
                   </a:txBody>
                   <a:tcPr anchor="ctr">
@@ -14614,8 +14928,26 @@
                     <a:bodyPr/>
                     <a:lstStyle/>
                     <a:p>
-                      <a:pPr algn="ctr"/>
-                      <a:endParaRPr lang="en-US" sz="3000" dirty="0"/>
+                      <a:pPr marL="0" marR="0" algn="ctr">
+                        <a:lnSpc>
+                          <a:spcPct val="107000"/>
+                        </a:lnSpc>
+                        <a:spcBef>
+                          <a:spcPts val="0"/>
+                        </a:spcBef>
+                        <a:spcAft>
+                          <a:spcPts val="800"/>
+                        </a:spcAft>
+                      </a:pPr>
+                      <a:r>
+                        <a:rPr lang="en-US" sz="2800">
+                          <a:effectLst/>
+                          <a:latin typeface="Calibri" panose="020F0502020204030204" pitchFamily="34" charset="0"/>
+                          <a:ea typeface="Calibri" panose="020F0502020204030204" pitchFamily="34" charset="0"/>
+                          <a:cs typeface="Times New Roman" panose="02020603050405020304" pitchFamily="18" charset="0"/>
+                        </a:rPr>
+                        <a:t>173</a:t>
+                      </a:r>
                     </a:p>
                   </a:txBody>
                   <a:tcPr anchor="ctr">
@@ -14635,8 +14967,26 @@
                     <a:bodyPr/>
                     <a:lstStyle/>
                     <a:p>
-                      <a:pPr algn="ctr"/>
-                      <a:endParaRPr lang="en-US" sz="3000" dirty="0"/>
+                      <a:pPr marL="0" marR="0" algn="ctr">
+                        <a:lnSpc>
+                          <a:spcPct val="107000"/>
+                        </a:lnSpc>
+                        <a:spcBef>
+                          <a:spcPts val="0"/>
+                        </a:spcBef>
+                        <a:spcAft>
+                          <a:spcPts val="800"/>
+                        </a:spcAft>
+                      </a:pPr>
+                      <a:r>
+                        <a:rPr lang="en-US" sz="2800">
+                          <a:effectLst/>
+                          <a:latin typeface="Calibri" panose="020F0502020204030204" pitchFamily="34" charset="0"/>
+                          <a:ea typeface="Calibri" panose="020F0502020204030204" pitchFamily="34" charset="0"/>
+                          <a:cs typeface="Times New Roman" panose="02020603050405020304" pitchFamily="18" charset="0"/>
+                        </a:rPr>
+                        <a:t>1356</a:t>
+                      </a:r>
                     </a:p>
                   </a:txBody>
                   <a:tcPr anchor="ctr">
@@ -14656,8 +15006,26 @@
                     <a:bodyPr/>
                     <a:lstStyle/>
                     <a:p>
-                      <a:pPr algn="ctr"/>
-                      <a:endParaRPr lang="en-US" sz="3000" dirty="0"/>
+                      <a:pPr marL="0" marR="0" algn="ctr">
+                        <a:lnSpc>
+                          <a:spcPct val="107000"/>
+                        </a:lnSpc>
+                        <a:spcBef>
+                          <a:spcPts val="0"/>
+                        </a:spcBef>
+                        <a:spcAft>
+                          <a:spcPts val="800"/>
+                        </a:spcAft>
+                      </a:pPr>
+                      <a:r>
+                        <a:rPr lang="en-US" sz="2800">
+                          <a:effectLst/>
+                          <a:latin typeface="Calibri" panose="020F0502020204030204" pitchFamily="34" charset="0"/>
+                          <a:ea typeface="Calibri" panose="020F0502020204030204" pitchFamily="34" charset="0"/>
+                          <a:cs typeface="Times New Roman" panose="02020603050405020304" pitchFamily="18" charset="0"/>
+                        </a:rPr>
+                        <a:t>231</a:t>
+                      </a:r>
                     </a:p>
                   </a:txBody>
                   <a:tcPr anchor="ctr">
@@ -14677,8 +15045,26 @@
                     <a:bodyPr/>
                     <a:lstStyle/>
                     <a:p>
-                      <a:pPr algn="ctr"/>
-                      <a:endParaRPr lang="en-US" sz="3000" dirty="0"/>
+                      <a:pPr marL="0" marR="0" algn="ctr">
+                        <a:lnSpc>
+                          <a:spcPct val="107000"/>
+                        </a:lnSpc>
+                        <a:spcBef>
+                          <a:spcPts val="0"/>
+                        </a:spcBef>
+                        <a:spcAft>
+                          <a:spcPts val="800"/>
+                        </a:spcAft>
+                      </a:pPr>
+                      <a:r>
+                        <a:rPr lang="en-US" sz="2800">
+                          <a:effectLst/>
+                          <a:latin typeface="Calibri" panose="020F0502020204030204" pitchFamily="34" charset="0"/>
+                          <a:ea typeface="Calibri" panose="020F0502020204030204" pitchFamily="34" charset="0"/>
+                          <a:cs typeface="Times New Roman" panose="02020603050405020304" pitchFamily="18" charset="0"/>
+                        </a:rPr>
+                        <a:t>1369</a:t>
+                      </a:r>
                     </a:p>
                   </a:txBody>
                   <a:tcPr anchor="ctr">
@@ -14698,8 +15084,26 @@
                     <a:bodyPr/>
                     <a:lstStyle/>
                     <a:p>
-                      <a:pPr algn="ctr"/>
-                      <a:endParaRPr lang="en-US" sz="3000" dirty="0"/>
+                      <a:pPr marL="0" marR="0" algn="ctr">
+                        <a:lnSpc>
+                          <a:spcPct val="107000"/>
+                        </a:lnSpc>
+                        <a:spcBef>
+                          <a:spcPts val="0"/>
+                        </a:spcBef>
+                        <a:spcAft>
+                          <a:spcPts val="800"/>
+                        </a:spcAft>
+                      </a:pPr>
+                      <a:r>
+                        <a:rPr lang="en-US" sz="2800">
+                          <a:effectLst/>
+                          <a:latin typeface="Calibri" panose="020F0502020204030204" pitchFamily="34" charset="0"/>
+                          <a:ea typeface="Calibri" panose="020F0502020204030204" pitchFamily="34" charset="0"/>
+                          <a:cs typeface="Times New Roman" panose="02020603050405020304" pitchFamily="18" charset="0"/>
+                        </a:rPr>
+                        <a:t>218</a:t>
+                      </a:r>
                     </a:p>
                   </a:txBody>
                   <a:tcPr anchor="ctr">
@@ -14719,8 +15123,26 @@
                     <a:bodyPr/>
                     <a:lstStyle/>
                     <a:p>
-                      <a:pPr algn="ctr"/>
-                      <a:endParaRPr lang="en-US" sz="3000" dirty="0"/>
+                      <a:pPr marL="0" marR="0" algn="ctr">
+                        <a:lnSpc>
+                          <a:spcPct val="107000"/>
+                        </a:lnSpc>
+                        <a:spcBef>
+                          <a:spcPts val="0"/>
+                        </a:spcBef>
+                        <a:spcAft>
+                          <a:spcPts val="800"/>
+                        </a:spcAft>
+                      </a:pPr>
+                      <a:r>
+                        <a:rPr lang="en-US" sz="2800">
+                          <a:effectLst/>
+                          <a:latin typeface="Calibri" panose="020F0502020204030204" pitchFamily="34" charset="0"/>
+                          <a:ea typeface="Calibri" panose="020F0502020204030204" pitchFamily="34" charset="0"/>
+                          <a:cs typeface="Times New Roman" panose="02020603050405020304" pitchFamily="18" charset="0"/>
+                        </a:rPr>
+                        <a:t>1333</a:t>
+                      </a:r>
                     </a:p>
                   </a:txBody>
                   <a:tcPr anchor="ctr">
@@ -14740,8 +15162,26 @@
                     <a:bodyPr/>
                     <a:lstStyle/>
                     <a:p>
-                      <a:pPr algn="ctr"/>
-                      <a:endParaRPr lang="en-US" sz="3000" dirty="0"/>
+                      <a:pPr marL="0" marR="0" algn="ctr">
+                        <a:lnSpc>
+                          <a:spcPct val="107000"/>
+                        </a:lnSpc>
+                        <a:spcBef>
+                          <a:spcPts val="0"/>
+                        </a:spcBef>
+                        <a:spcAft>
+                          <a:spcPts val="800"/>
+                        </a:spcAft>
+                      </a:pPr>
+                      <a:r>
+                        <a:rPr lang="en-US" sz="2800">
+                          <a:effectLst/>
+                          <a:latin typeface="Calibri" panose="020F0502020204030204" pitchFamily="34" charset="0"/>
+                          <a:ea typeface="Calibri" panose="020F0502020204030204" pitchFamily="34" charset="0"/>
+                          <a:cs typeface="Times New Roman" panose="02020603050405020304" pitchFamily="18" charset="0"/>
+                        </a:rPr>
+                        <a:t>254</a:t>
+                      </a:r>
                     </a:p>
                   </a:txBody>
                   <a:tcPr anchor="ctr"/>
@@ -14801,8 +15241,26 @@
                     <a:bodyPr/>
                     <a:lstStyle/>
                     <a:p>
-                      <a:pPr algn="ctr"/>
-                      <a:endParaRPr lang="en-US" sz="3000" dirty="0"/>
+                      <a:pPr marL="0" marR="0" algn="ctr">
+                        <a:lnSpc>
+                          <a:spcPct val="107000"/>
+                        </a:lnSpc>
+                        <a:spcBef>
+                          <a:spcPts val="0"/>
+                        </a:spcBef>
+                        <a:spcAft>
+                          <a:spcPts val="800"/>
+                        </a:spcAft>
+                      </a:pPr>
+                      <a:r>
+                        <a:rPr lang="en-US" sz="2800">
+                          <a:effectLst/>
+                          <a:latin typeface="Calibri" panose="020F0502020204030204" pitchFamily="34" charset="0"/>
+                          <a:ea typeface="Calibri" panose="020F0502020204030204" pitchFamily="34" charset="0"/>
+                          <a:cs typeface="Times New Roman" panose="02020603050405020304" pitchFamily="18" charset="0"/>
+                        </a:rPr>
+                        <a:t>32</a:t>
+                      </a:r>
                     </a:p>
                   </a:txBody>
                   <a:tcPr anchor="ctr">
@@ -14822,8 +15280,26 @@
                     <a:bodyPr/>
                     <a:lstStyle/>
                     <a:p>
-                      <a:pPr algn="ctr"/>
-                      <a:endParaRPr lang="en-US" sz="3000" dirty="0"/>
+                      <a:pPr marL="0" marR="0" algn="ctr">
+                        <a:lnSpc>
+                          <a:spcPct val="107000"/>
+                        </a:lnSpc>
+                        <a:spcBef>
+                          <a:spcPts val="0"/>
+                        </a:spcBef>
+                        <a:spcAft>
+                          <a:spcPts val="800"/>
+                        </a:spcAft>
+                      </a:pPr>
+                      <a:r>
+                        <a:rPr lang="en-US" sz="2800">
+                          <a:effectLst/>
+                          <a:latin typeface="Calibri" panose="020F0502020204030204" pitchFamily="34" charset="0"/>
+                          <a:ea typeface="Calibri" panose="020F0502020204030204" pitchFamily="34" charset="0"/>
+                          <a:cs typeface="Times New Roman" panose="02020603050405020304" pitchFamily="18" charset="0"/>
+                        </a:rPr>
+                        <a:t>26</a:t>
+                      </a:r>
                     </a:p>
                   </a:txBody>
                   <a:tcPr anchor="ctr">
@@ -14843,8 +15319,26 @@
                     <a:bodyPr/>
                     <a:lstStyle/>
                     <a:p>
-                      <a:pPr algn="ctr"/>
-                      <a:endParaRPr lang="en-US" sz="3000" dirty="0"/>
+                      <a:pPr marL="0" marR="0" algn="ctr">
+                        <a:lnSpc>
+                          <a:spcPct val="107000"/>
+                        </a:lnSpc>
+                        <a:spcBef>
+                          <a:spcPts val="0"/>
+                        </a:spcBef>
+                        <a:spcAft>
+                          <a:spcPts val="800"/>
+                        </a:spcAft>
+                      </a:pPr>
+                      <a:r>
+                        <a:rPr lang="en-US" sz="2800">
+                          <a:effectLst/>
+                          <a:latin typeface="Calibri" panose="020F0502020204030204" pitchFamily="34" charset="0"/>
+                          <a:ea typeface="Calibri" panose="020F0502020204030204" pitchFamily="34" charset="0"/>
+                          <a:cs typeface="Times New Roman" panose="02020603050405020304" pitchFamily="18" charset="0"/>
+                        </a:rPr>
+                        <a:t>30</a:t>
+                      </a:r>
                     </a:p>
                   </a:txBody>
                   <a:tcPr anchor="ctr">
@@ -14864,8 +15358,26 @@
                     <a:bodyPr/>
                     <a:lstStyle/>
                     <a:p>
-                      <a:pPr algn="ctr"/>
-                      <a:endParaRPr lang="en-US" sz="3000" dirty="0"/>
+                      <a:pPr marL="0" marR="0" algn="ctr">
+                        <a:lnSpc>
+                          <a:spcPct val="107000"/>
+                        </a:lnSpc>
+                        <a:spcBef>
+                          <a:spcPts val="0"/>
+                        </a:spcBef>
+                        <a:spcAft>
+                          <a:spcPts val="800"/>
+                        </a:spcAft>
+                      </a:pPr>
+                      <a:r>
+                        <a:rPr lang="en-US" sz="2800">
+                          <a:effectLst/>
+                          <a:latin typeface="Calibri" panose="020F0502020204030204" pitchFamily="34" charset="0"/>
+                          <a:ea typeface="Calibri" panose="020F0502020204030204" pitchFamily="34" charset="0"/>
+                          <a:cs typeface="Times New Roman" panose="02020603050405020304" pitchFamily="18" charset="0"/>
+                        </a:rPr>
+                        <a:t>28</a:t>
+                      </a:r>
                     </a:p>
                   </a:txBody>
                   <a:tcPr anchor="ctr">
@@ -14885,8 +15397,26 @@
                     <a:bodyPr/>
                     <a:lstStyle/>
                     <a:p>
-                      <a:pPr algn="ctr"/>
-                      <a:endParaRPr lang="en-US" sz="3000" dirty="0"/>
+                      <a:pPr marL="0" marR="0" algn="ctr">
+                        <a:lnSpc>
+                          <a:spcPct val="107000"/>
+                        </a:lnSpc>
+                        <a:spcBef>
+                          <a:spcPts val="0"/>
+                        </a:spcBef>
+                        <a:spcAft>
+                          <a:spcPts val="800"/>
+                        </a:spcAft>
+                      </a:pPr>
+                      <a:r>
+                        <a:rPr lang="en-US" sz="2800">
+                          <a:effectLst/>
+                          <a:latin typeface="Calibri" panose="020F0502020204030204" pitchFamily="34" charset="0"/>
+                          <a:ea typeface="Calibri" panose="020F0502020204030204" pitchFamily="34" charset="0"/>
+                          <a:cs typeface="Times New Roman" panose="02020603050405020304" pitchFamily="18" charset="0"/>
+                        </a:rPr>
+                        <a:t>29</a:t>
+                      </a:r>
                     </a:p>
                   </a:txBody>
                   <a:tcPr anchor="ctr">
@@ -14906,8 +15436,26 @@
                     <a:bodyPr/>
                     <a:lstStyle/>
                     <a:p>
-                      <a:pPr algn="ctr"/>
-                      <a:endParaRPr lang="en-US" sz="3000" dirty="0"/>
+                      <a:pPr marL="0" marR="0" algn="ctr">
+                        <a:lnSpc>
+                          <a:spcPct val="107000"/>
+                        </a:lnSpc>
+                        <a:spcBef>
+                          <a:spcPts val="0"/>
+                        </a:spcBef>
+                        <a:spcAft>
+                          <a:spcPts val="800"/>
+                        </a:spcAft>
+                      </a:pPr>
+                      <a:r>
+                        <a:rPr lang="en-US" sz="2800">
+                          <a:effectLst/>
+                          <a:latin typeface="Calibri" panose="020F0502020204030204" pitchFamily="34" charset="0"/>
+                          <a:ea typeface="Calibri" panose="020F0502020204030204" pitchFamily="34" charset="0"/>
+                          <a:cs typeface="Times New Roman" panose="02020603050405020304" pitchFamily="18" charset="0"/>
+                        </a:rPr>
+                        <a:t>29</a:t>
+                      </a:r>
                     </a:p>
                   </a:txBody>
                   <a:tcPr anchor="ctr">
@@ -14927,8 +15475,26 @@
                     <a:bodyPr/>
                     <a:lstStyle/>
                     <a:p>
-                      <a:pPr algn="ctr"/>
-                      <a:endParaRPr lang="en-US" sz="3000" dirty="0"/>
+                      <a:pPr marL="0" marR="0" algn="ctr">
+                        <a:lnSpc>
+                          <a:spcPct val="107000"/>
+                        </a:lnSpc>
+                        <a:spcBef>
+                          <a:spcPts val="0"/>
+                        </a:spcBef>
+                        <a:spcAft>
+                          <a:spcPts val="800"/>
+                        </a:spcAft>
+                      </a:pPr>
+                      <a:r>
+                        <a:rPr lang="en-US" sz="2800">
+                          <a:effectLst/>
+                          <a:latin typeface="Calibri" panose="020F0502020204030204" pitchFamily="34" charset="0"/>
+                          <a:ea typeface="Calibri" panose="020F0502020204030204" pitchFamily="34" charset="0"/>
+                          <a:cs typeface="Times New Roman" panose="02020603050405020304" pitchFamily="18" charset="0"/>
+                        </a:rPr>
+                        <a:t>26</a:t>
+                      </a:r>
                     </a:p>
                   </a:txBody>
                   <a:tcPr anchor="ctr">
@@ -14948,8 +15514,26 @@
                     <a:bodyPr/>
                     <a:lstStyle/>
                     <a:p>
-                      <a:pPr algn="ctr"/>
-                      <a:endParaRPr lang="en-US" sz="3000" dirty="0"/>
+                      <a:pPr marL="0" marR="0" algn="ctr">
+                        <a:lnSpc>
+                          <a:spcPct val="107000"/>
+                        </a:lnSpc>
+                        <a:spcBef>
+                          <a:spcPts val="0"/>
+                        </a:spcBef>
+                        <a:spcAft>
+                          <a:spcPts val="800"/>
+                        </a:spcAft>
+                      </a:pPr>
+                      <a:r>
+                        <a:rPr lang="en-US" sz="2800" dirty="0">
+                          <a:effectLst/>
+                          <a:latin typeface="Calibri" panose="020F0502020204030204" pitchFamily="34" charset="0"/>
+                          <a:ea typeface="Calibri" panose="020F0502020204030204" pitchFamily="34" charset="0"/>
+                          <a:cs typeface="Times New Roman" panose="02020603050405020304" pitchFamily="18" charset="0"/>
+                        </a:rPr>
+                        <a:t>32</a:t>
+                      </a:r>
                     </a:p>
                   </a:txBody>
                   <a:tcPr anchor="ctr"/>
@@ -14959,6 +15543,262 @@
           </a:graphicData>
         </a:graphic>
       </p:graphicFrame>
+      <p:sp>
+        <p:nvSpPr>
+          <p:cNvPr id="6" name="TextBox 5"/>
+          <p:cNvSpPr txBox="1"/>
+          <p:nvPr/>
+        </p:nvSpPr>
+        <p:spPr>
+          <a:xfrm>
+            <a:off x="1978845" y="33157441"/>
+            <a:ext cx="12313368" cy="6986528"/>
+          </a:xfrm>
+          <a:prstGeom prst="rect">
+            <a:avLst/>
+          </a:prstGeom>
+          <a:noFill/>
+        </p:spPr>
+        <p:txBody>
+          <a:bodyPr wrap="square" rtlCol="0">
+            <a:spAutoFit/>
+          </a:bodyPr>
+          <a:lstStyle/>
+          <a:p>
+            <a:r>
+              <a:rPr lang="sr-Latn-BA" sz="3200" dirty="0" smtClean="0"/>
+              <a:t>-iz navedene tabele se vidi da kombinovanjem različitih grupa atributa dobijaju slični rezultati</a:t>
+            </a:r>
+          </a:p>
+          <a:p>
+            <a:r>
+              <a:rPr lang="sr-Latn-BA" sz="3200" dirty="0" smtClean="0"/>
+              <a:t>-najbolja f1 mjera je dobijena ukoliko su korišteni samo atributi dobijeni na osnovu mreže</a:t>
+            </a:r>
+          </a:p>
+          <a:p>
+            <a:r>
+              <a:rPr lang="sr-Latn-BA" sz="3200" dirty="0" smtClean="0"/>
+              <a:t>-dok svi kombinacija pogađa najviše IDP proteina</a:t>
+            </a:r>
+          </a:p>
+          <a:p>
+            <a:r>
+              <a:rPr lang="sr-Latn-BA" sz="3200" dirty="0" smtClean="0"/>
+              <a:t>-preliminarlni rezultati ukazuju da kombinovanje atributa iz mreže i sekvence ima potencijal i da se otvara prostor za dalje unapređenje ovog metoda</a:t>
+            </a:r>
+          </a:p>
+          <a:p>
+            <a:r>
+              <a:rPr lang="sr-Latn-BA" sz="3200" dirty="0" smtClean="0"/>
+              <a:t>-predloženu metodu treba primijeniti i na druge mreže drugih organizama, uključujući i ljudske mreže; pored toga kombinovanje postojećih atributa zajedno sa atributima dobijenih na osnovu drugih osobina samog proteina može biti perspektivan pravac za dalja istraživanja</a:t>
+            </a:r>
+          </a:p>
+          <a:p>
+            <a:r>
+              <a:rPr lang="sr-Latn-BA" sz="3200" dirty="0" smtClean="0"/>
+              <a:t> </a:t>
+            </a:r>
+            <a:endParaRPr lang="en-US" sz="3200" dirty="0"/>
+          </a:p>
+        </p:txBody>
+      </p:sp>
+      <p:sp>
+        <p:nvSpPr>
+          <p:cNvPr id="46" name="Arrow: Right 19">
+            <a:extLst>
+              <a:ext uri="{FF2B5EF4-FFF2-40B4-BE49-F238E27FC236}">
+                <a16:creationId xmlns="" xmlns:a16="http://schemas.microsoft.com/office/drawing/2014/main" id="{F75BF84B-2C0D-4C09-BA31-AFAAC77EAF11}"/>
+              </a:ext>
+            </a:extLst>
+          </p:cNvPr>
+          <p:cNvSpPr/>
+          <p:nvPr/>
+        </p:nvSpPr>
+        <p:spPr>
+          <a:xfrm>
+            <a:off x="3851053" y="17819737"/>
+            <a:ext cx="1053527" cy="748945"/>
+          </a:xfrm>
+          <a:prstGeom prst="rightArrow">
+            <a:avLst/>
+          </a:prstGeom>
+        </p:spPr>
+        <p:style>
+          <a:lnRef idx="2">
+            <a:schemeClr val="accent1">
+              <a:shade val="50000"/>
+            </a:schemeClr>
+          </a:lnRef>
+          <a:fillRef idx="1">
+            <a:schemeClr val="accent1"/>
+          </a:fillRef>
+          <a:effectRef idx="0">
+            <a:schemeClr val="accent1"/>
+          </a:effectRef>
+          <a:fontRef idx="minor">
+            <a:schemeClr val="lt1"/>
+          </a:fontRef>
+        </p:style>
+        <p:txBody>
+          <a:bodyPr rtlCol="0" anchor="ctr"/>
+          <a:lstStyle/>
+          <a:p>
+            <a:pPr algn="ctr"/>
+            <a:endParaRPr lang="en-US"/>
+          </a:p>
+        </p:txBody>
+      </p:sp>
+      <p:sp>
+        <p:nvSpPr>
+          <p:cNvPr id="9" name="TextBox 8"/>
+          <p:cNvSpPr txBox="1"/>
+          <p:nvPr/>
+        </p:nvSpPr>
+        <p:spPr>
+          <a:xfrm>
+            <a:off x="1906837" y="19043873"/>
+            <a:ext cx="2520280" cy="276999"/>
+          </a:xfrm>
+          <a:prstGeom prst="rect">
+            <a:avLst/>
+          </a:prstGeom>
+          <a:noFill/>
+        </p:spPr>
+        <p:txBody>
+          <a:bodyPr wrap="square" rtlCol="0">
+            <a:spAutoFit/>
+          </a:bodyPr>
+          <a:lstStyle/>
+          <a:p>
+            <a:r>
+              <a:rPr lang="sr-Latn-BA" sz="1200" dirty="0" smtClean="0"/>
+              <a:t>Picture from...</a:t>
+            </a:r>
+            <a:endParaRPr lang="en-US" sz="1200" dirty="0"/>
+          </a:p>
+        </p:txBody>
+      </p:sp>
+      <p:sp>
+        <p:nvSpPr>
+          <p:cNvPr id="13" name="TextBox 12"/>
+          <p:cNvSpPr txBox="1"/>
+          <p:nvPr/>
+        </p:nvSpPr>
+        <p:spPr>
+          <a:xfrm>
+            <a:off x="5596337" y="18035761"/>
+            <a:ext cx="504056" cy="276999"/>
+          </a:xfrm>
+          <a:prstGeom prst="rect">
+            <a:avLst/>
+          </a:prstGeom>
+          <a:noFill/>
+        </p:spPr>
+        <p:txBody>
+          <a:bodyPr wrap="square" rtlCol="0">
+            <a:spAutoFit/>
+          </a:bodyPr>
+          <a:lstStyle/>
+          <a:p>
+            <a:r>
+              <a:rPr lang="sr-Latn-BA" sz="1200" dirty="0" smtClean="0"/>
+              <a:t>1.4</a:t>
+            </a:r>
+            <a:endParaRPr lang="en-US" sz="1200" dirty="0"/>
+          </a:p>
+        </p:txBody>
+      </p:sp>
+      <p:sp>
+        <p:nvSpPr>
+          <p:cNvPr id="53" name="TextBox 52"/>
+          <p:cNvSpPr txBox="1"/>
+          <p:nvPr/>
+        </p:nvSpPr>
+        <p:spPr>
+          <a:xfrm>
+            <a:off x="6947397" y="17171665"/>
+            <a:ext cx="504056" cy="279648"/>
+          </a:xfrm>
+          <a:prstGeom prst="rect">
+            <a:avLst/>
+          </a:prstGeom>
+          <a:noFill/>
+        </p:spPr>
+        <p:txBody>
+          <a:bodyPr wrap="square" rtlCol="0">
+            <a:spAutoFit/>
+          </a:bodyPr>
+          <a:lstStyle/>
+          <a:p>
+            <a:r>
+              <a:rPr lang="sr-Latn-BA" sz="1200" dirty="0" smtClean="0"/>
+              <a:t>2.5</a:t>
+            </a:r>
+            <a:endParaRPr lang="en-US" sz="1200" dirty="0"/>
+          </a:p>
+        </p:txBody>
+      </p:sp>
+      <p:sp>
+        <p:nvSpPr>
+          <p:cNvPr id="65" name="TextBox 64"/>
+          <p:cNvSpPr txBox="1"/>
+          <p:nvPr/>
+        </p:nvSpPr>
+        <p:spPr>
+          <a:xfrm>
+            <a:off x="5291213" y="17603713"/>
+            <a:ext cx="504056" cy="276999"/>
+          </a:xfrm>
+          <a:prstGeom prst="rect">
+            <a:avLst/>
+          </a:prstGeom>
+          <a:noFill/>
+        </p:spPr>
+        <p:txBody>
+          <a:bodyPr wrap="square" rtlCol="0">
+            <a:spAutoFit/>
+          </a:bodyPr>
+          <a:lstStyle/>
+          <a:p>
+            <a:r>
+              <a:rPr lang="sr-Latn-BA" sz="1200" dirty="0" smtClean="0"/>
+              <a:t>1.4</a:t>
+            </a:r>
+            <a:endParaRPr lang="en-US" sz="1200" dirty="0"/>
+          </a:p>
+        </p:txBody>
+      </p:sp>
+      <p:sp>
+        <p:nvSpPr>
+          <p:cNvPr id="66" name="TextBox 65"/>
+          <p:cNvSpPr txBox="1"/>
+          <p:nvPr/>
+        </p:nvSpPr>
+        <p:spPr>
+          <a:xfrm>
+            <a:off x="5147197" y="16883633"/>
+            <a:ext cx="504056" cy="276999"/>
+          </a:xfrm>
+          <a:prstGeom prst="rect">
+            <a:avLst/>
+          </a:prstGeom>
+          <a:noFill/>
+        </p:spPr>
+        <p:txBody>
+          <a:bodyPr wrap="square" rtlCol="0">
+            <a:spAutoFit/>
+          </a:bodyPr>
+          <a:lstStyle/>
+          <a:p>
+            <a:r>
+              <a:rPr lang="sr-Latn-BA" sz="1200" dirty="0" smtClean="0"/>
+              <a:t>1.4</a:t>
+            </a:r>
+            <a:endParaRPr lang="en-US" sz="1200" dirty="0"/>
+          </a:p>
+        </p:txBody>
+      </p:sp>
     </p:spTree>
   </p:cSld>
   <p:clrMapOvr>

</xml_diff>